<commit_message>
Pick up and delivery with numbers
Only can use number 1 or 2 for the orders depending on if its pick up or delivery
</commit_message>
<xml_diff>
--- a/022_91893+_+91897+Documentation.pptx
+++ b/022_91893+_+91897+Documentation.pptx
@@ -5,7 +5,7 @@
     <p:sldMasterId id="2147483659" r:id="rId1"/>
   </p:sldMasterIdLst>
   <p:notesMasterIdLst>
-    <p:notesMasterId r:id="rId12"/>
+    <p:notesMasterId r:id="rId17"/>
   </p:notesMasterIdLst>
   <p:sldIdLst>
     <p:sldId id="256" r:id="rId2"/>
@@ -13,11 +13,16 @@
     <p:sldId id="258" r:id="rId4"/>
     <p:sldId id="259" r:id="rId5"/>
     <p:sldId id="260" r:id="rId6"/>
-    <p:sldId id="265" r:id="rId7"/>
+    <p:sldId id="264" r:id="rId7"/>
     <p:sldId id="263" r:id="rId8"/>
-    <p:sldId id="264" r:id="rId9"/>
-    <p:sldId id="261" r:id="rId10"/>
-    <p:sldId id="262" r:id="rId11"/>
+    <p:sldId id="265" r:id="rId9"/>
+    <p:sldId id="268" r:id="rId10"/>
+    <p:sldId id="267" r:id="rId11"/>
+    <p:sldId id="269" r:id="rId12"/>
+    <p:sldId id="270" r:id="rId13"/>
+    <p:sldId id="266" r:id="rId14"/>
+    <p:sldId id="261" r:id="rId15"/>
+    <p:sldId id="262" r:id="rId16"/>
   </p:sldIdLst>
   <p:sldSz cx="9144000" cy="5143500" type="screen16x9"/>
   <p:notesSz cx="6858000" cy="9144000"/>
@@ -272,7 +277,7 @@
 <file path=ppt/revisionInfo.xml><?xml version="1.0" encoding="utf-8"?>
 <p1510:revInfo xmlns:a="http://schemas.openxmlformats.org/drawingml/2006/main" xmlns:r="http://schemas.openxmlformats.org/officeDocument/2006/relationships" xmlns:p1510="http://schemas.microsoft.com/office/powerpoint/2015/10/main">
   <p1510:revLst>
-    <p1510:client id="{C8C7263D-22F5-480D-A4A7-EE3D0F0DB4C3}" v="4" dt="2022-02-14T21:38:41.387"/>
+    <p1510:client id="{C8C7263D-22F5-480D-A4A7-EE3D0F0DB4C3}" v="6" dt="2022-02-15T20:36:20.014"/>
   </p1510:revLst>
 </p1510:revInfo>
 </file>
@@ -282,7 +287,7 @@
   <pc:docChgLst>
     <pc:chgData name="George El Hayek" userId="e516d85fdd18eb06" providerId="LiveId" clId="{C8C7263D-22F5-480D-A4A7-EE3D0F0DB4C3}"/>
     <pc:docChg chg="undo custSel addSld modSld sldOrd">
-      <pc:chgData name="George El Hayek" userId="e516d85fdd18eb06" providerId="LiveId" clId="{C8C7263D-22F5-480D-A4A7-EE3D0F0DB4C3}" dt="2022-02-14T21:39:42.857" v="316" actId="208"/>
+      <pc:chgData name="George El Hayek" userId="e516d85fdd18eb06" providerId="LiveId" clId="{C8C7263D-22F5-480D-A4A7-EE3D0F0DB4C3}" dt="2022-02-15T20:56:45.023" v="834" actId="1076"/>
       <pc:docMkLst>
         <pc:docMk/>
       </pc:docMkLst>
@@ -418,8 +423,8 @@
           </ac:picMkLst>
         </pc:picChg>
       </pc:sldChg>
-      <pc:sldChg chg="modSp add mod ord">
-        <pc:chgData name="George El Hayek" userId="e516d85fdd18eb06" providerId="LiveId" clId="{C8C7263D-22F5-480D-A4A7-EE3D0F0DB4C3}" dt="2022-02-13T23:43:48.086" v="16"/>
+      <pc:sldChg chg="addSp modSp add mod ord">
+        <pc:chgData name="George El Hayek" userId="e516d85fdd18eb06" providerId="LiveId" clId="{C8C7263D-22F5-480D-A4A7-EE3D0F0DB4C3}" dt="2022-02-15T20:17:09.333" v="407" actId="22"/>
         <pc:sldMkLst>
           <pc:docMk/>
           <pc:sldMk cId="1060606800" sldId="263"/>
@@ -432,15 +437,23 @@
             <ac:spMk id="73" creationId="{00000000-0000-0000-0000-000000000000}"/>
           </ac:spMkLst>
         </pc:spChg>
+        <pc:picChg chg="add">
+          <ac:chgData name="George El Hayek" userId="e516d85fdd18eb06" providerId="LiveId" clId="{C8C7263D-22F5-480D-A4A7-EE3D0F0DB4C3}" dt="2022-02-15T20:17:09.333" v="407" actId="22"/>
+          <ac:picMkLst>
+            <pc:docMk/>
+            <pc:sldMk cId="1060606800" sldId="263"/>
+            <ac:picMk id="3" creationId="{AE7E94F7-15E4-4B17-9019-7FE05A5EAC96}"/>
+          </ac:picMkLst>
+        </pc:picChg>
       </pc:sldChg>
       <pc:sldChg chg="addSp modSp add mod ord">
-        <pc:chgData name="George El Hayek" userId="e516d85fdd18eb06" providerId="LiveId" clId="{C8C7263D-22F5-480D-A4A7-EE3D0F0DB4C3}" dt="2022-02-14T21:36:06.344" v="268" actId="20577"/>
+        <pc:chgData name="George El Hayek" userId="e516d85fdd18eb06" providerId="LiveId" clId="{C8C7263D-22F5-480D-A4A7-EE3D0F0DB4C3}" dt="2022-02-15T20:13:10.004" v="352" actId="20577"/>
         <pc:sldMkLst>
           <pc:docMk/>
           <pc:sldMk cId="365359497" sldId="264"/>
         </pc:sldMkLst>
         <pc:spChg chg="mod">
-          <ac:chgData name="George El Hayek" userId="e516d85fdd18eb06" providerId="LiveId" clId="{C8C7263D-22F5-480D-A4A7-EE3D0F0DB4C3}" dt="2022-02-13T23:43:57.546" v="19" actId="20577"/>
+          <ac:chgData name="George El Hayek" userId="e516d85fdd18eb06" providerId="LiveId" clId="{C8C7263D-22F5-480D-A4A7-EE3D0F0DB4C3}" dt="2022-02-15T20:13:10.004" v="352" actId="20577"/>
           <ac:spMkLst>
             <pc:docMk/>
             <pc:sldMk cId="365359497" sldId="264"/>
@@ -472,14 +485,14 @@
           </ac:picMkLst>
         </pc:picChg>
       </pc:sldChg>
-      <pc:sldChg chg="delSp modSp add mod">
-        <pc:chgData name="George El Hayek" userId="e516d85fdd18eb06" providerId="LiveId" clId="{C8C7263D-22F5-480D-A4A7-EE3D0F0DB4C3}" dt="2022-02-14T21:32:28.454" v="171" actId="20577"/>
+      <pc:sldChg chg="addSp delSp modSp add mod">
+        <pc:chgData name="George El Hayek" userId="e516d85fdd18eb06" providerId="LiveId" clId="{C8C7263D-22F5-480D-A4A7-EE3D0F0DB4C3}" dt="2022-02-15T20:26:51.148" v="669" actId="20577"/>
         <pc:sldMkLst>
           <pc:docMk/>
           <pc:sldMk cId="1137492495" sldId="265"/>
         </pc:sldMkLst>
         <pc:spChg chg="mod">
-          <ac:chgData name="George El Hayek" userId="e516d85fdd18eb06" providerId="LiveId" clId="{C8C7263D-22F5-480D-A4A7-EE3D0F0DB4C3}" dt="2022-02-14T21:32:28.454" v="171" actId="20577"/>
+          <ac:chgData name="George El Hayek" userId="e516d85fdd18eb06" providerId="LiveId" clId="{C8C7263D-22F5-480D-A4A7-EE3D0F0DB4C3}" dt="2022-02-15T20:13:28.103" v="380" actId="20577"/>
           <ac:spMkLst>
             <pc:docMk/>
             <pc:sldMk cId="1137492495" sldId="265"/>
@@ -487,13 +500,21 @@
           </ac:spMkLst>
         </pc:spChg>
         <pc:graphicFrameChg chg="modGraphic">
-          <ac:chgData name="George El Hayek" userId="e516d85fdd18eb06" providerId="LiveId" clId="{C8C7263D-22F5-480D-A4A7-EE3D0F0DB4C3}" dt="2022-02-14T00:20:37.132" v="155" actId="20577"/>
+          <ac:chgData name="George El Hayek" userId="e516d85fdd18eb06" providerId="LiveId" clId="{C8C7263D-22F5-480D-A4A7-EE3D0F0DB4C3}" dt="2022-02-15T20:26:51.148" v="669" actId="20577"/>
           <ac:graphicFrameMkLst>
             <pc:docMk/>
             <pc:sldMk cId="1137492495" sldId="265"/>
             <ac:graphicFrameMk id="79" creationId="{00000000-0000-0000-0000-000000000000}"/>
           </ac:graphicFrameMkLst>
         </pc:graphicFrameChg>
+        <pc:picChg chg="add del mod">
+          <ac:chgData name="George El Hayek" userId="e516d85fdd18eb06" providerId="LiveId" clId="{C8C7263D-22F5-480D-A4A7-EE3D0F0DB4C3}" dt="2022-02-15T20:23:03.726" v="572" actId="478"/>
+          <ac:picMkLst>
+            <pc:docMk/>
+            <pc:sldMk cId="1137492495" sldId="265"/>
+            <ac:picMk id="3" creationId="{30D954E6-4E60-4D32-8D68-3009FCC53A58}"/>
+          </ac:picMkLst>
+        </pc:picChg>
         <pc:picChg chg="del">
           <ac:chgData name="George El Hayek" userId="e516d85fdd18eb06" providerId="LiveId" clId="{C8C7263D-22F5-480D-A4A7-EE3D0F0DB4C3}" dt="2022-02-14T00:20:19.903" v="150" actId="478"/>
           <ac:picMkLst>
@@ -508,6 +529,177 @@
             <pc:docMk/>
             <pc:sldMk cId="1137492495" sldId="265"/>
             <ac:picMk id="5" creationId="{1809D109-70D1-4670-B437-F0F69DC16E14}"/>
+          </ac:picMkLst>
+        </pc:picChg>
+        <pc:picChg chg="add del mod">
+          <ac:chgData name="George El Hayek" userId="e516d85fdd18eb06" providerId="LiveId" clId="{C8C7263D-22F5-480D-A4A7-EE3D0F0DB4C3}" dt="2022-02-15T20:25:20.816" v="585" actId="478"/>
+          <ac:picMkLst>
+            <pc:docMk/>
+            <pc:sldMk cId="1137492495" sldId="265"/>
+            <ac:picMk id="5" creationId="{91E5A385-8464-49EA-A8EA-156C3BEF1CAE}"/>
+          </ac:picMkLst>
+        </pc:picChg>
+        <pc:picChg chg="add mod">
+          <ac:chgData name="George El Hayek" userId="e516d85fdd18eb06" providerId="LiveId" clId="{C8C7263D-22F5-480D-A4A7-EE3D0F0DB4C3}" dt="2022-02-15T20:25:27.196" v="588" actId="1076"/>
+          <ac:picMkLst>
+            <pc:docMk/>
+            <pc:sldMk cId="1137492495" sldId="265"/>
+            <ac:picMk id="7" creationId="{7F006EC4-A2EF-4EB8-83C8-3AE5758EEE9C}"/>
+          </ac:picMkLst>
+        </pc:picChg>
+      </pc:sldChg>
+      <pc:sldChg chg="add ord">
+        <pc:chgData name="George El Hayek" userId="e516d85fdd18eb06" providerId="LiveId" clId="{C8C7263D-22F5-480D-A4A7-EE3D0F0DB4C3}" dt="2022-02-15T20:13:43.098" v="406"/>
+        <pc:sldMkLst>
+          <pc:docMk/>
+          <pc:sldMk cId="2298535692" sldId="266"/>
+        </pc:sldMkLst>
+      </pc:sldChg>
+      <pc:sldChg chg="addSp delSp modSp add mod ord">
+        <pc:chgData name="George El Hayek" userId="e516d85fdd18eb06" providerId="LiveId" clId="{C8C7263D-22F5-480D-A4A7-EE3D0F0DB4C3}" dt="2022-02-15T20:37:13.231" v="746" actId="20577"/>
+        <pc:sldMkLst>
+          <pc:docMk/>
+          <pc:sldMk cId="1549901026" sldId="267"/>
+        </pc:sldMkLst>
+        <pc:spChg chg="add del">
+          <ac:chgData name="George El Hayek" userId="e516d85fdd18eb06" providerId="LiveId" clId="{C8C7263D-22F5-480D-A4A7-EE3D0F0DB4C3}" dt="2022-02-15T20:36:06.560" v="679" actId="478"/>
+          <ac:spMkLst>
+            <pc:docMk/>
+            <pc:sldMk cId="1549901026" sldId="267"/>
+            <ac:spMk id="7" creationId="{8A74BB99-9323-4516-ABB5-FF8518BE2259}"/>
+          </ac:spMkLst>
+        </pc:spChg>
+        <pc:spChg chg="mod">
+          <ac:chgData name="George El Hayek" userId="e516d85fdd18eb06" providerId="LiveId" clId="{C8C7263D-22F5-480D-A4A7-EE3D0F0DB4C3}" dt="2022-02-15T20:27:11.332" v="673" actId="20577"/>
+          <ac:spMkLst>
+            <pc:docMk/>
+            <pc:sldMk cId="1549901026" sldId="267"/>
+            <ac:spMk id="78" creationId="{00000000-0000-0000-0000-000000000000}"/>
+          </ac:spMkLst>
+        </pc:spChg>
+        <pc:graphicFrameChg chg="mod modGraphic">
+          <ac:chgData name="George El Hayek" userId="e516d85fdd18eb06" providerId="LiveId" clId="{C8C7263D-22F5-480D-A4A7-EE3D0F0DB4C3}" dt="2022-02-15T20:37:13.231" v="746" actId="20577"/>
+          <ac:graphicFrameMkLst>
+            <pc:docMk/>
+            <pc:sldMk cId="1549901026" sldId="267"/>
+            <ac:graphicFrameMk id="79" creationId="{00000000-0000-0000-0000-000000000000}"/>
+          </ac:graphicFrameMkLst>
+        </pc:graphicFrameChg>
+        <pc:picChg chg="add mod">
+          <ac:chgData name="George El Hayek" userId="e516d85fdd18eb06" providerId="LiveId" clId="{C8C7263D-22F5-480D-A4A7-EE3D0F0DB4C3}" dt="2022-02-15T20:35:45.093" v="676" actId="1076"/>
+          <ac:picMkLst>
+            <pc:docMk/>
+            <pc:sldMk cId="1549901026" sldId="267"/>
+            <ac:picMk id="3" creationId="{DB7B73FB-54E5-4EEE-A858-02EAADEFA2A5}"/>
+          </ac:picMkLst>
+        </pc:picChg>
+      </pc:sldChg>
+      <pc:sldChg chg="modSp add mod">
+        <pc:chgData name="George El Hayek" userId="e516d85fdd18eb06" providerId="LiveId" clId="{C8C7263D-22F5-480D-A4A7-EE3D0F0DB4C3}" dt="2022-02-15T20:23:48.775" v="584" actId="20577"/>
+        <pc:sldMkLst>
+          <pc:docMk/>
+          <pc:sldMk cId="2117696396" sldId="268"/>
+        </pc:sldMkLst>
+        <pc:spChg chg="mod">
+          <ac:chgData name="George El Hayek" userId="e516d85fdd18eb06" providerId="LiveId" clId="{C8C7263D-22F5-480D-A4A7-EE3D0F0DB4C3}" dt="2022-02-15T20:23:48.775" v="584" actId="20577"/>
+          <ac:spMkLst>
+            <pc:docMk/>
+            <pc:sldMk cId="2117696396" sldId="268"/>
+            <ac:spMk id="78" creationId="{00000000-0000-0000-0000-000000000000}"/>
+          </ac:spMkLst>
+        </pc:spChg>
+      </pc:sldChg>
+      <pc:sldChg chg="addSp delSp modSp add mod">
+        <pc:chgData name="George El Hayek" userId="e516d85fdd18eb06" providerId="LiveId" clId="{C8C7263D-22F5-480D-A4A7-EE3D0F0DB4C3}" dt="2022-02-15T20:51:03.209" v="819" actId="1076"/>
+        <pc:sldMkLst>
+          <pc:docMk/>
+          <pc:sldMk cId="1024250125" sldId="269"/>
+        </pc:sldMkLst>
+        <pc:spChg chg="mod">
+          <ac:chgData name="George El Hayek" userId="e516d85fdd18eb06" providerId="LiveId" clId="{C8C7263D-22F5-480D-A4A7-EE3D0F0DB4C3}" dt="2022-02-15T20:50:52.680" v="816" actId="1076"/>
+          <ac:spMkLst>
+            <pc:docMk/>
+            <pc:sldMk cId="1024250125" sldId="269"/>
+            <ac:spMk id="78" creationId="{00000000-0000-0000-0000-000000000000}"/>
+          </ac:spMkLst>
+        </pc:spChg>
+        <pc:graphicFrameChg chg="mod modGraphic">
+          <ac:chgData name="George El Hayek" userId="e516d85fdd18eb06" providerId="LiveId" clId="{C8C7263D-22F5-480D-A4A7-EE3D0F0DB4C3}" dt="2022-02-15T20:51:03.209" v="819" actId="1076"/>
+          <ac:graphicFrameMkLst>
+            <pc:docMk/>
+            <pc:sldMk cId="1024250125" sldId="269"/>
+            <ac:graphicFrameMk id="79" creationId="{00000000-0000-0000-0000-000000000000}"/>
+          </ac:graphicFrameMkLst>
+        </pc:graphicFrameChg>
+        <pc:picChg chg="del">
+          <ac:chgData name="George El Hayek" userId="e516d85fdd18eb06" providerId="LiveId" clId="{C8C7263D-22F5-480D-A4A7-EE3D0F0DB4C3}" dt="2022-02-15T20:47:26.624" v="750" actId="478"/>
+          <ac:picMkLst>
+            <pc:docMk/>
+            <pc:sldMk cId="1024250125" sldId="269"/>
+            <ac:picMk id="3" creationId="{DB7B73FB-54E5-4EEE-A858-02EAADEFA2A5}"/>
+          </ac:picMkLst>
+        </pc:picChg>
+        <pc:picChg chg="add mod">
+          <ac:chgData name="George El Hayek" userId="e516d85fdd18eb06" providerId="LiveId" clId="{C8C7263D-22F5-480D-A4A7-EE3D0F0DB4C3}" dt="2022-02-15T20:50:56.230" v="817" actId="1076"/>
+          <ac:picMkLst>
+            <pc:docMk/>
+            <pc:sldMk cId="1024250125" sldId="269"/>
+            <ac:picMk id="4" creationId="{57CF45F0-39C7-4E7C-BF08-6249FA424E61}"/>
+          </ac:picMkLst>
+        </pc:picChg>
+        <pc:picChg chg="add mod">
+          <ac:chgData name="George El Hayek" userId="e516d85fdd18eb06" providerId="LiveId" clId="{C8C7263D-22F5-480D-A4A7-EE3D0F0DB4C3}" dt="2022-02-15T20:50:58.493" v="818" actId="1076"/>
+          <ac:picMkLst>
+            <pc:docMk/>
+            <pc:sldMk cId="1024250125" sldId="269"/>
+            <ac:picMk id="6" creationId="{8445A261-316E-4722-BB93-DDC7629B61A3}"/>
+          </ac:picMkLst>
+        </pc:picChg>
+      </pc:sldChg>
+      <pc:sldChg chg="addSp delSp modSp add mod">
+        <pc:chgData name="George El Hayek" userId="e516d85fdd18eb06" providerId="LiveId" clId="{C8C7263D-22F5-480D-A4A7-EE3D0F0DB4C3}" dt="2022-02-15T20:56:45.023" v="834" actId="1076"/>
+        <pc:sldMkLst>
+          <pc:docMk/>
+          <pc:sldMk cId="568495832" sldId="270"/>
+        </pc:sldMkLst>
+        <pc:spChg chg="mod">
+          <ac:chgData name="George El Hayek" userId="e516d85fdd18eb06" providerId="LiveId" clId="{C8C7263D-22F5-480D-A4A7-EE3D0F0DB4C3}" dt="2022-02-15T20:51:20.474" v="824" actId="20577"/>
+          <ac:spMkLst>
+            <pc:docMk/>
+            <pc:sldMk cId="568495832" sldId="270"/>
+            <ac:spMk id="78" creationId="{00000000-0000-0000-0000-000000000000}"/>
+          </ac:spMkLst>
+        </pc:spChg>
+        <pc:graphicFrameChg chg="mod modGraphic">
+          <ac:chgData name="George El Hayek" userId="e516d85fdd18eb06" providerId="LiveId" clId="{C8C7263D-22F5-480D-A4A7-EE3D0F0DB4C3}" dt="2022-02-15T20:56:45.023" v="834" actId="1076"/>
+          <ac:graphicFrameMkLst>
+            <pc:docMk/>
+            <pc:sldMk cId="568495832" sldId="270"/>
+            <ac:graphicFrameMk id="79" creationId="{00000000-0000-0000-0000-000000000000}"/>
+          </ac:graphicFrameMkLst>
+        </pc:graphicFrameChg>
+        <pc:picChg chg="add mod">
+          <ac:chgData name="George El Hayek" userId="e516d85fdd18eb06" providerId="LiveId" clId="{C8C7263D-22F5-480D-A4A7-EE3D0F0DB4C3}" dt="2022-02-15T20:56:41.767" v="833" actId="1076"/>
+          <ac:picMkLst>
+            <pc:docMk/>
+            <pc:sldMk cId="568495832" sldId="270"/>
+            <ac:picMk id="3" creationId="{DC1BBAB8-C482-4F89-9E01-214718EDBD3C}"/>
+          </ac:picMkLst>
+        </pc:picChg>
+        <pc:picChg chg="del">
+          <ac:chgData name="George El Hayek" userId="e516d85fdd18eb06" providerId="LiveId" clId="{C8C7263D-22F5-480D-A4A7-EE3D0F0DB4C3}" dt="2022-02-15T20:51:22.004" v="825" actId="478"/>
+          <ac:picMkLst>
+            <pc:docMk/>
+            <pc:sldMk cId="568495832" sldId="270"/>
+            <ac:picMk id="4" creationId="{57CF45F0-39C7-4E7C-BF08-6249FA424E61}"/>
+          </ac:picMkLst>
+        </pc:picChg>
+        <pc:picChg chg="del">
+          <ac:chgData name="George El Hayek" userId="e516d85fdd18eb06" providerId="LiveId" clId="{C8C7263D-22F5-480D-A4A7-EE3D0F0DB4C3}" dt="2022-02-15T20:51:22.984" v="826" actId="478"/>
+          <ac:picMkLst>
+            <pc:docMk/>
+            <pc:sldMk cId="568495832" sldId="270"/>
+            <ac:picMk id="6" creationId="{8445A261-316E-4722-BB93-DDC7629B61A3}"/>
           </ac:picMkLst>
         </pc:picChg>
       </pc:sldChg>
@@ -1105,6 +1297,567 @@
   <p:cSld>
     <p:spTree>
       <p:nvGrpSpPr>
+        <p:cNvPr id="1" name="Shape 74"/>
+        <p:cNvGrpSpPr/>
+        <p:nvPr/>
+      </p:nvGrpSpPr>
+      <p:grpSpPr>
+        <a:xfrm>
+          <a:off x="0" y="0"/>
+          <a:ext cx="0" cy="0"/>
+          <a:chOff x="0" y="0"/>
+          <a:chExt cx="0" cy="0"/>
+        </a:xfrm>
+      </p:grpSpPr>
+      <p:sp>
+        <p:nvSpPr>
+          <p:cNvPr id="75" name="Google Shape;75;gac10fef634_0_20:notes"/>
+          <p:cNvSpPr>
+            <a:spLocks noGrp="1" noRot="1" noChangeAspect="1"/>
+          </p:cNvSpPr>
+          <p:nvPr>
+            <p:ph type="sldImg" idx="2"/>
+          </p:nvPr>
+        </p:nvSpPr>
+        <p:spPr>
+          <a:xfrm>
+            <a:off x="381000" y="685800"/>
+            <a:ext cx="6096000" cy="3429000"/>
+          </a:xfrm>
+          <a:custGeom>
+            <a:avLst/>
+            <a:gdLst/>
+            <a:ahLst/>
+            <a:cxnLst/>
+            <a:rect l="l" t="t" r="r" b="b"/>
+            <a:pathLst>
+              <a:path w="120000" h="120000" extrusionOk="0">
+                <a:moveTo>
+                  <a:pt x="0" y="0"/>
+                </a:moveTo>
+                <a:lnTo>
+                  <a:pt x="120000" y="0"/>
+                </a:lnTo>
+                <a:lnTo>
+                  <a:pt x="120000" y="120000"/>
+                </a:lnTo>
+                <a:lnTo>
+                  <a:pt x="0" y="120000"/>
+                </a:lnTo>
+                <a:close/>
+              </a:path>
+            </a:pathLst>
+          </a:custGeom>
+        </p:spPr>
+      </p:sp>
+      <p:sp>
+        <p:nvSpPr>
+          <p:cNvPr id="76" name="Google Shape;76;gac10fef634_0_20:notes"/>
+          <p:cNvSpPr txBox="1">
+            <a:spLocks noGrp="1"/>
+          </p:cNvSpPr>
+          <p:nvPr>
+            <p:ph type="body" idx="1"/>
+          </p:nvPr>
+        </p:nvSpPr>
+        <p:spPr>
+          <a:xfrm>
+            <a:off x="685800" y="4343400"/>
+            <a:ext cx="5486400" cy="4114800"/>
+          </a:xfrm>
+          <a:prstGeom prst="rect">
+            <a:avLst/>
+          </a:prstGeom>
+        </p:spPr>
+        <p:txBody>
+          <a:bodyPr spcFirstLastPara="1" wrap="square" lIns="91425" tIns="91425" rIns="91425" bIns="91425" anchor="t" anchorCtr="0">
+            <a:noAutofit/>
+          </a:bodyPr>
+          <a:lstStyle/>
+          <a:p>
+            <a:pPr marL="0" lvl="0" indent="0" algn="l" rtl="0">
+              <a:spcBef>
+                <a:spcPts val="0"/>
+              </a:spcBef>
+              <a:spcAft>
+                <a:spcPts val="0"/>
+              </a:spcAft>
+              <a:buNone/>
+            </a:pPr>
+            <a:endParaRPr/>
+          </a:p>
+        </p:txBody>
+      </p:sp>
+    </p:spTree>
+    <p:extLst>
+      <p:ext uri="{BB962C8B-B14F-4D97-AF65-F5344CB8AC3E}">
+        <p14:creationId xmlns:p14="http://schemas.microsoft.com/office/powerpoint/2010/main" val="3187217127"/>
+      </p:ext>
+    </p:extLst>
+  </p:cSld>
+  <p:clrMapOvr>
+    <a:masterClrMapping/>
+  </p:clrMapOvr>
+</p:notes>
+</file>
+
+<file path=ppt/notesSlides/notesSlide11.xml><?xml version="1.0" encoding="utf-8"?>
+<p:notes xmlns:a="http://schemas.openxmlformats.org/drawingml/2006/main" xmlns:r="http://schemas.openxmlformats.org/officeDocument/2006/relationships" xmlns:p="http://schemas.openxmlformats.org/presentationml/2006/main" showMasterSp="0" showMasterPhAnim="0">
+  <p:cSld>
+    <p:spTree>
+      <p:nvGrpSpPr>
+        <p:cNvPr id="1" name="Shape 74"/>
+        <p:cNvGrpSpPr/>
+        <p:nvPr/>
+      </p:nvGrpSpPr>
+      <p:grpSpPr>
+        <a:xfrm>
+          <a:off x="0" y="0"/>
+          <a:ext cx="0" cy="0"/>
+          <a:chOff x="0" y="0"/>
+          <a:chExt cx="0" cy="0"/>
+        </a:xfrm>
+      </p:grpSpPr>
+      <p:sp>
+        <p:nvSpPr>
+          <p:cNvPr id="75" name="Google Shape;75;gac10fef634_0_20:notes"/>
+          <p:cNvSpPr>
+            <a:spLocks noGrp="1" noRot="1" noChangeAspect="1"/>
+          </p:cNvSpPr>
+          <p:nvPr>
+            <p:ph type="sldImg" idx="2"/>
+          </p:nvPr>
+        </p:nvSpPr>
+        <p:spPr>
+          <a:xfrm>
+            <a:off x="381000" y="685800"/>
+            <a:ext cx="6096000" cy="3429000"/>
+          </a:xfrm>
+          <a:custGeom>
+            <a:avLst/>
+            <a:gdLst/>
+            <a:ahLst/>
+            <a:cxnLst/>
+            <a:rect l="l" t="t" r="r" b="b"/>
+            <a:pathLst>
+              <a:path w="120000" h="120000" extrusionOk="0">
+                <a:moveTo>
+                  <a:pt x="0" y="0"/>
+                </a:moveTo>
+                <a:lnTo>
+                  <a:pt x="120000" y="0"/>
+                </a:lnTo>
+                <a:lnTo>
+                  <a:pt x="120000" y="120000"/>
+                </a:lnTo>
+                <a:lnTo>
+                  <a:pt x="0" y="120000"/>
+                </a:lnTo>
+                <a:close/>
+              </a:path>
+            </a:pathLst>
+          </a:custGeom>
+        </p:spPr>
+      </p:sp>
+      <p:sp>
+        <p:nvSpPr>
+          <p:cNvPr id="76" name="Google Shape;76;gac10fef634_0_20:notes"/>
+          <p:cNvSpPr txBox="1">
+            <a:spLocks noGrp="1"/>
+          </p:cNvSpPr>
+          <p:nvPr>
+            <p:ph type="body" idx="1"/>
+          </p:nvPr>
+        </p:nvSpPr>
+        <p:spPr>
+          <a:xfrm>
+            <a:off x="685800" y="4343400"/>
+            <a:ext cx="5486400" cy="4114800"/>
+          </a:xfrm>
+          <a:prstGeom prst="rect">
+            <a:avLst/>
+          </a:prstGeom>
+        </p:spPr>
+        <p:txBody>
+          <a:bodyPr spcFirstLastPara="1" wrap="square" lIns="91425" tIns="91425" rIns="91425" bIns="91425" anchor="t" anchorCtr="0">
+            <a:noAutofit/>
+          </a:bodyPr>
+          <a:lstStyle/>
+          <a:p>
+            <a:pPr marL="0" lvl="0" indent="0" algn="l" rtl="0">
+              <a:spcBef>
+                <a:spcPts val="0"/>
+              </a:spcBef>
+              <a:spcAft>
+                <a:spcPts val="0"/>
+              </a:spcAft>
+              <a:buNone/>
+            </a:pPr>
+            <a:endParaRPr/>
+          </a:p>
+        </p:txBody>
+      </p:sp>
+    </p:spTree>
+    <p:extLst>
+      <p:ext uri="{BB962C8B-B14F-4D97-AF65-F5344CB8AC3E}">
+        <p14:creationId xmlns:p14="http://schemas.microsoft.com/office/powerpoint/2010/main" val="339962824"/>
+      </p:ext>
+    </p:extLst>
+  </p:cSld>
+  <p:clrMapOvr>
+    <a:masterClrMapping/>
+  </p:clrMapOvr>
+</p:notes>
+</file>
+
+<file path=ppt/notesSlides/notesSlide12.xml><?xml version="1.0" encoding="utf-8"?>
+<p:notes xmlns:a="http://schemas.openxmlformats.org/drawingml/2006/main" xmlns:r="http://schemas.openxmlformats.org/officeDocument/2006/relationships" xmlns:p="http://schemas.openxmlformats.org/presentationml/2006/main" showMasterSp="0" showMasterPhAnim="0">
+  <p:cSld>
+    <p:spTree>
+      <p:nvGrpSpPr>
+        <p:cNvPr id="1" name="Shape 74"/>
+        <p:cNvGrpSpPr/>
+        <p:nvPr/>
+      </p:nvGrpSpPr>
+      <p:grpSpPr>
+        <a:xfrm>
+          <a:off x="0" y="0"/>
+          <a:ext cx="0" cy="0"/>
+          <a:chOff x="0" y="0"/>
+          <a:chExt cx="0" cy="0"/>
+        </a:xfrm>
+      </p:grpSpPr>
+      <p:sp>
+        <p:nvSpPr>
+          <p:cNvPr id="75" name="Google Shape;75;gac10fef634_0_20:notes"/>
+          <p:cNvSpPr>
+            <a:spLocks noGrp="1" noRot="1" noChangeAspect="1"/>
+          </p:cNvSpPr>
+          <p:nvPr>
+            <p:ph type="sldImg" idx="2"/>
+          </p:nvPr>
+        </p:nvSpPr>
+        <p:spPr>
+          <a:xfrm>
+            <a:off x="381000" y="685800"/>
+            <a:ext cx="6096000" cy="3429000"/>
+          </a:xfrm>
+          <a:custGeom>
+            <a:avLst/>
+            <a:gdLst/>
+            <a:ahLst/>
+            <a:cxnLst/>
+            <a:rect l="l" t="t" r="r" b="b"/>
+            <a:pathLst>
+              <a:path w="120000" h="120000" extrusionOk="0">
+                <a:moveTo>
+                  <a:pt x="0" y="0"/>
+                </a:moveTo>
+                <a:lnTo>
+                  <a:pt x="120000" y="0"/>
+                </a:lnTo>
+                <a:lnTo>
+                  <a:pt x="120000" y="120000"/>
+                </a:lnTo>
+                <a:lnTo>
+                  <a:pt x="0" y="120000"/>
+                </a:lnTo>
+                <a:close/>
+              </a:path>
+            </a:pathLst>
+          </a:custGeom>
+        </p:spPr>
+      </p:sp>
+      <p:sp>
+        <p:nvSpPr>
+          <p:cNvPr id="76" name="Google Shape;76;gac10fef634_0_20:notes"/>
+          <p:cNvSpPr txBox="1">
+            <a:spLocks noGrp="1"/>
+          </p:cNvSpPr>
+          <p:nvPr>
+            <p:ph type="body" idx="1"/>
+          </p:nvPr>
+        </p:nvSpPr>
+        <p:spPr>
+          <a:xfrm>
+            <a:off x="685800" y="4343400"/>
+            <a:ext cx="5486400" cy="4114800"/>
+          </a:xfrm>
+          <a:prstGeom prst="rect">
+            <a:avLst/>
+          </a:prstGeom>
+        </p:spPr>
+        <p:txBody>
+          <a:bodyPr spcFirstLastPara="1" wrap="square" lIns="91425" tIns="91425" rIns="91425" bIns="91425" anchor="t" anchorCtr="0">
+            <a:noAutofit/>
+          </a:bodyPr>
+          <a:lstStyle/>
+          <a:p>
+            <a:pPr marL="0" lvl="0" indent="0" algn="l" rtl="0">
+              <a:spcBef>
+                <a:spcPts val="0"/>
+              </a:spcBef>
+              <a:spcAft>
+                <a:spcPts val="0"/>
+              </a:spcAft>
+              <a:buNone/>
+            </a:pPr>
+            <a:endParaRPr/>
+          </a:p>
+        </p:txBody>
+      </p:sp>
+    </p:spTree>
+    <p:extLst>
+      <p:ext uri="{BB962C8B-B14F-4D97-AF65-F5344CB8AC3E}">
+        <p14:creationId xmlns:p14="http://schemas.microsoft.com/office/powerpoint/2010/main" val="157241064"/>
+      </p:ext>
+    </p:extLst>
+  </p:cSld>
+  <p:clrMapOvr>
+    <a:masterClrMapping/>
+  </p:clrMapOvr>
+</p:notes>
+</file>
+
+<file path=ppt/notesSlides/notesSlide13.xml><?xml version="1.0" encoding="utf-8"?>
+<p:notes xmlns:a="http://schemas.openxmlformats.org/drawingml/2006/main" xmlns:r="http://schemas.openxmlformats.org/officeDocument/2006/relationships" xmlns:p="http://schemas.openxmlformats.org/presentationml/2006/main" showMasterSp="0" showMasterPhAnim="0">
+  <p:cSld>
+    <p:spTree>
+      <p:nvGrpSpPr>
+        <p:cNvPr id="1" name="Shape 69"/>
+        <p:cNvGrpSpPr/>
+        <p:nvPr/>
+      </p:nvGrpSpPr>
+      <p:grpSpPr>
+        <a:xfrm>
+          <a:off x="0" y="0"/>
+          <a:ext cx="0" cy="0"/>
+          <a:chOff x="0" y="0"/>
+          <a:chExt cx="0" cy="0"/>
+        </a:xfrm>
+      </p:grpSpPr>
+      <p:sp>
+        <p:nvSpPr>
+          <p:cNvPr id="70" name="Google Shape;70;gac10fef634_0_16:notes"/>
+          <p:cNvSpPr>
+            <a:spLocks noGrp="1" noRot="1" noChangeAspect="1"/>
+          </p:cNvSpPr>
+          <p:nvPr>
+            <p:ph type="sldImg" idx="2"/>
+          </p:nvPr>
+        </p:nvSpPr>
+        <p:spPr>
+          <a:xfrm>
+            <a:off x="381000" y="685800"/>
+            <a:ext cx="6096000" cy="3429000"/>
+          </a:xfrm>
+          <a:custGeom>
+            <a:avLst/>
+            <a:gdLst/>
+            <a:ahLst/>
+            <a:cxnLst/>
+            <a:rect l="l" t="t" r="r" b="b"/>
+            <a:pathLst>
+              <a:path w="120000" h="120000" extrusionOk="0">
+                <a:moveTo>
+                  <a:pt x="0" y="0"/>
+                </a:moveTo>
+                <a:lnTo>
+                  <a:pt x="120000" y="0"/>
+                </a:lnTo>
+                <a:lnTo>
+                  <a:pt x="120000" y="120000"/>
+                </a:lnTo>
+                <a:lnTo>
+                  <a:pt x="0" y="120000"/>
+                </a:lnTo>
+                <a:close/>
+              </a:path>
+            </a:pathLst>
+          </a:custGeom>
+        </p:spPr>
+      </p:sp>
+      <p:sp>
+        <p:nvSpPr>
+          <p:cNvPr id="71" name="Google Shape;71;gac10fef634_0_16:notes"/>
+          <p:cNvSpPr txBox="1">
+            <a:spLocks noGrp="1"/>
+          </p:cNvSpPr>
+          <p:nvPr>
+            <p:ph type="body" idx="1"/>
+          </p:nvPr>
+        </p:nvSpPr>
+        <p:spPr>
+          <a:xfrm>
+            <a:off x="685800" y="4343400"/>
+            <a:ext cx="5486400" cy="4114800"/>
+          </a:xfrm>
+          <a:prstGeom prst="rect">
+            <a:avLst/>
+          </a:prstGeom>
+        </p:spPr>
+        <p:txBody>
+          <a:bodyPr spcFirstLastPara="1" wrap="square" lIns="91425" tIns="91425" rIns="91425" bIns="91425" anchor="t" anchorCtr="0">
+            <a:noAutofit/>
+          </a:bodyPr>
+          <a:lstStyle/>
+          <a:p>
+            <a:pPr marL="0" lvl="0" indent="0" algn="l" rtl="0">
+              <a:spcBef>
+                <a:spcPts val="0"/>
+              </a:spcBef>
+              <a:spcAft>
+                <a:spcPts val="0"/>
+              </a:spcAft>
+              <a:buNone/>
+            </a:pPr>
+            <a:endParaRPr/>
+          </a:p>
+        </p:txBody>
+      </p:sp>
+    </p:spTree>
+    <p:extLst>
+      <p:ext uri="{BB962C8B-B14F-4D97-AF65-F5344CB8AC3E}">
+        <p14:creationId xmlns:p14="http://schemas.microsoft.com/office/powerpoint/2010/main" val="1092163332"/>
+      </p:ext>
+    </p:extLst>
+  </p:cSld>
+  <p:clrMapOvr>
+    <a:masterClrMapping/>
+  </p:clrMapOvr>
+</p:notes>
+</file>
+
+<file path=ppt/notesSlides/notesSlide14.xml><?xml version="1.0" encoding="utf-8"?>
+<p:notes xmlns:a="http://schemas.openxmlformats.org/drawingml/2006/main" xmlns:r="http://schemas.openxmlformats.org/officeDocument/2006/relationships" xmlns:p="http://schemas.openxmlformats.org/presentationml/2006/main" showMasterSp="0" showMasterPhAnim="0">
+  <p:cSld>
+    <p:spTree>
+      <p:nvGrpSpPr>
+        <p:cNvPr id="1" name="Shape 80"/>
+        <p:cNvGrpSpPr/>
+        <p:nvPr/>
+      </p:nvGrpSpPr>
+      <p:grpSpPr>
+        <a:xfrm>
+          <a:off x="0" y="0"/>
+          <a:ext cx="0" cy="0"/>
+          <a:chOff x="0" y="0"/>
+          <a:chExt cx="0" cy="0"/>
+        </a:xfrm>
+      </p:grpSpPr>
+      <p:sp>
+        <p:nvSpPr>
+          <p:cNvPr id="81" name="Google Shape;81;gac10fef634_0_25:notes"/>
+          <p:cNvSpPr>
+            <a:spLocks noGrp="1" noRot="1" noChangeAspect="1"/>
+          </p:cNvSpPr>
+          <p:nvPr>
+            <p:ph type="sldImg" idx="2"/>
+          </p:nvPr>
+        </p:nvSpPr>
+        <p:spPr>
+          <a:xfrm>
+            <a:off x="381000" y="685800"/>
+            <a:ext cx="6096000" cy="3429000"/>
+          </a:xfrm>
+          <a:custGeom>
+            <a:avLst/>
+            <a:gdLst/>
+            <a:ahLst/>
+            <a:cxnLst/>
+            <a:rect l="l" t="t" r="r" b="b"/>
+            <a:pathLst>
+              <a:path w="120000" h="120000" extrusionOk="0">
+                <a:moveTo>
+                  <a:pt x="0" y="0"/>
+                </a:moveTo>
+                <a:lnTo>
+                  <a:pt x="120000" y="0"/>
+                </a:lnTo>
+                <a:lnTo>
+                  <a:pt x="120000" y="120000"/>
+                </a:lnTo>
+                <a:lnTo>
+                  <a:pt x="0" y="120000"/>
+                </a:lnTo>
+                <a:close/>
+              </a:path>
+            </a:pathLst>
+          </a:custGeom>
+        </p:spPr>
+      </p:sp>
+      <p:sp>
+        <p:nvSpPr>
+          <p:cNvPr id="82" name="Google Shape;82;gac10fef634_0_25:notes"/>
+          <p:cNvSpPr txBox="1">
+            <a:spLocks noGrp="1"/>
+          </p:cNvSpPr>
+          <p:nvPr>
+            <p:ph type="body" idx="1"/>
+          </p:nvPr>
+        </p:nvSpPr>
+        <p:spPr>
+          <a:xfrm>
+            <a:off x="685800" y="4343400"/>
+            <a:ext cx="5486400" cy="4114800"/>
+          </a:xfrm>
+          <a:prstGeom prst="rect">
+            <a:avLst/>
+          </a:prstGeom>
+        </p:spPr>
+        <p:txBody>
+          <a:bodyPr spcFirstLastPara="1" wrap="square" lIns="91425" tIns="91425" rIns="91425" bIns="91425" anchor="t" anchorCtr="0">
+            <a:noAutofit/>
+          </a:bodyPr>
+          <a:lstStyle/>
+          <a:p>
+            <a:pPr marL="0" lvl="0" indent="0" algn="l" rtl="0">
+              <a:spcBef>
+                <a:spcPts val="0"/>
+              </a:spcBef>
+              <a:spcAft>
+                <a:spcPts val="0"/>
+              </a:spcAft>
+              <a:buClr>
+                <a:schemeClr val="dk1"/>
+              </a:buClr>
+              <a:buSzPts val="1100"/>
+              <a:buFont typeface="Arial"/>
+              <a:buNone/>
+            </a:pPr>
+            <a:r>
+              <a:rPr lang="en"/>
+              <a:t>Your version control evidence should go here.  This could be in the form of annotated screenshots which show you you managed this process or you could make a brief screencast explaining how you implemented version control.</a:t>
+            </a:r>
+            <a:endParaRPr/>
+          </a:p>
+          <a:p>
+            <a:pPr marL="0" lvl="0" indent="0" algn="l" rtl="0">
+              <a:spcBef>
+                <a:spcPts val="0"/>
+              </a:spcBef>
+              <a:spcAft>
+                <a:spcPts val="0"/>
+              </a:spcAft>
+              <a:buNone/>
+            </a:pPr>
+            <a:endParaRPr/>
+          </a:p>
+        </p:txBody>
+      </p:sp>
+    </p:spTree>
+  </p:cSld>
+  <p:clrMapOvr>
+    <a:masterClrMapping/>
+  </p:clrMapOvr>
+</p:notes>
+</file>
+
+<file path=ppt/notesSlides/notesSlide15.xml><?xml version="1.0" encoding="utf-8"?>
+<p:notes xmlns:a="http://schemas.openxmlformats.org/drawingml/2006/main" xmlns:r="http://schemas.openxmlformats.org/officeDocument/2006/relationships" xmlns:p="http://schemas.openxmlformats.org/presentationml/2006/main" showMasterSp="0" showMasterPhAnim="0">
+  <p:cSld>
+    <p:spTree>
+      <p:nvGrpSpPr>
         <p:cNvPr id="1" name="Shape 86"/>
         <p:cNvGrpSpPr/>
         <p:nvPr/>
@@ -1748,7 +2501,7 @@
     </p:spTree>
     <p:extLst>
       <p:ext uri="{BB962C8B-B14F-4D97-AF65-F5344CB8AC3E}">
-        <p14:creationId xmlns:p14="http://schemas.microsoft.com/office/powerpoint/2010/main" val="3913451101"/>
+        <p14:creationId xmlns:p14="http://schemas.microsoft.com/office/powerpoint/2010/main" val="33097536"/>
       </p:ext>
     </p:extLst>
   </p:cSld>
@@ -1966,7 +2719,7 @@
     </p:spTree>
     <p:extLst>
       <p:ext uri="{BB962C8B-B14F-4D97-AF65-F5344CB8AC3E}">
-        <p14:creationId xmlns:p14="http://schemas.microsoft.com/office/powerpoint/2010/main" val="33097536"/>
+        <p14:creationId xmlns:p14="http://schemas.microsoft.com/office/powerpoint/2010/main" val="3913451101"/>
       </p:ext>
     </p:extLst>
   </p:cSld>
@@ -1981,7 +2734,7 @@
   <p:cSld>
     <p:spTree>
       <p:nvGrpSpPr>
-        <p:cNvPr id="1" name="Shape 80"/>
+        <p:cNvPr id="1" name="Shape 74"/>
         <p:cNvGrpSpPr/>
         <p:nvPr/>
       </p:nvGrpSpPr>
@@ -1995,7 +2748,7 @@
       </p:grpSpPr>
       <p:sp>
         <p:nvSpPr>
-          <p:cNvPr id="81" name="Google Shape;81;gac10fef634_0_25:notes"/>
+          <p:cNvPr id="75" name="Google Shape;75;gac10fef634_0_20:notes"/>
           <p:cNvSpPr>
             <a:spLocks noGrp="1" noRot="1" noChangeAspect="1"/>
           </p:cNvSpPr>
@@ -2036,7 +2789,7 @@
       </p:sp>
       <p:sp>
         <p:nvSpPr>
-          <p:cNvPr id="82" name="Google Shape;82;gac10fef634_0_25:notes"/>
+          <p:cNvPr id="76" name="Google Shape;76;gac10fef634_0_20:notes"/>
           <p:cNvSpPr txBox="1">
             <a:spLocks noGrp="1"/>
           </p:cNvSpPr>
@@ -2066,27 +2819,6 @@
               <a:spcAft>
                 <a:spcPts val="0"/>
               </a:spcAft>
-              <a:buClr>
-                <a:schemeClr val="dk1"/>
-              </a:buClr>
-              <a:buSzPts val="1100"/>
-              <a:buFont typeface="Arial"/>
-              <a:buNone/>
-            </a:pPr>
-            <a:r>
-              <a:rPr lang="en"/>
-              <a:t>Your version control evidence should go here.  This could be in the form of annotated screenshots which show you you managed this process or you could make a brief screencast explaining how you implemented version control.</a:t>
-            </a:r>
-            <a:endParaRPr/>
-          </a:p>
-          <a:p>
-            <a:pPr marL="0" lvl="0" indent="0" algn="l" rtl="0">
-              <a:spcBef>
-                <a:spcPts val="0"/>
-              </a:spcBef>
-              <a:spcAft>
-                <a:spcPts val="0"/>
-              </a:spcAft>
               <a:buNone/>
             </a:pPr>
             <a:endParaRPr/>
@@ -2094,6 +2826,11 @@
         </p:txBody>
       </p:sp>
     </p:spTree>
+    <p:extLst>
+      <p:ext uri="{BB962C8B-B14F-4D97-AF65-F5344CB8AC3E}">
+        <p14:creationId xmlns:p14="http://schemas.microsoft.com/office/powerpoint/2010/main" val="4031544433"/>
+      </p:ext>
+    </p:extLst>
   </p:cSld>
   <p:clrMapOvr>
     <a:masterClrMapping/>
@@ -7105,6 +7842,1190 @@
 <file path=ppt/slides/slide10.xml><?xml version="1.0" encoding="utf-8"?>
 <p:sld xmlns:a="http://schemas.openxmlformats.org/drawingml/2006/main" xmlns:r="http://schemas.openxmlformats.org/officeDocument/2006/relationships" xmlns:p="http://schemas.openxmlformats.org/presentationml/2006/main">
   <p:cSld>
+    <p:spTree>
+      <p:nvGrpSpPr>
+        <p:cNvPr id="1" name="Shape 77"/>
+        <p:cNvGrpSpPr/>
+        <p:nvPr/>
+      </p:nvGrpSpPr>
+      <p:grpSpPr>
+        <a:xfrm>
+          <a:off x="0" y="0"/>
+          <a:ext cx="0" cy="0"/>
+          <a:chOff x="0" y="0"/>
+          <a:chExt cx="0" cy="0"/>
+        </a:xfrm>
+      </p:grpSpPr>
+      <p:sp>
+        <p:nvSpPr>
+          <p:cNvPr id="78" name="Google Shape;78;p17"/>
+          <p:cNvSpPr txBox="1">
+            <a:spLocks noGrp="1"/>
+          </p:cNvSpPr>
+          <p:nvPr>
+            <p:ph type="title"/>
+          </p:nvPr>
+        </p:nvSpPr>
+        <p:spPr>
+          <a:xfrm>
+            <a:off x="311700" y="445025"/>
+            <a:ext cx="8520600" cy="572700"/>
+          </a:xfrm>
+          <a:prstGeom prst="rect">
+            <a:avLst/>
+          </a:prstGeom>
+        </p:spPr>
+        <p:txBody>
+          <a:bodyPr spcFirstLastPara="1" wrap="square" lIns="91425" tIns="91425" rIns="91425" bIns="91425" anchor="t" anchorCtr="0">
+            <a:noAutofit/>
+          </a:bodyPr>
+          <a:lstStyle/>
+          <a:p>
+            <a:pPr marL="0" lvl="0" indent="0" algn="l" rtl="0">
+              <a:spcBef>
+                <a:spcPts val="0"/>
+              </a:spcBef>
+              <a:spcAft>
+                <a:spcPts val="0"/>
+              </a:spcAft>
+              <a:buNone/>
+            </a:pPr>
+            <a:r>
+              <a:rPr lang="en" dirty="0"/>
+              <a:t>Component 2 version 3 - Test Plan (?and screenshot)</a:t>
+            </a:r>
+            <a:endParaRPr dirty="0"/>
+          </a:p>
+        </p:txBody>
+      </p:sp>
+      <p:graphicFrame>
+        <p:nvGraphicFramePr>
+          <p:cNvPr id="79" name="Google Shape;79;p17"/>
+          <p:cNvGraphicFramePr/>
+          <p:nvPr>
+            <p:extLst>
+              <p:ext uri="{D42A27DB-BD31-4B8C-83A1-F6EECF244321}">
+                <p14:modId xmlns:p14="http://schemas.microsoft.com/office/powerpoint/2010/main" val="3327753929"/>
+              </p:ext>
+            </p:extLst>
+          </p:nvPr>
+        </p:nvGraphicFramePr>
+        <p:xfrm>
+          <a:off x="252227" y="3371589"/>
+          <a:ext cx="8520600" cy="2011620"/>
+        </p:xfrm>
+        <a:graphic>
+          <a:graphicData uri="http://schemas.openxmlformats.org/drawingml/2006/table">
+            <a:tbl>
+              <a:tblPr>
+                <a:noFill/>
+                <a:tableStyleId>{E1099E06-0E6B-448D-9D27-60429F06E6F4}</a:tableStyleId>
+              </a:tblPr>
+              <a:tblGrid>
+                <a:gridCol w="4260300">
+                  <a:extLst>
+                    <a:ext uri="{9D8B030D-6E8A-4147-A177-3AD203B41FA5}">
+                      <a16:colId xmlns:a16="http://schemas.microsoft.com/office/drawing/2014/main" val="20000"/>
+                    </a:ext>
+                  </a:extLst>
+                </a:gridCol>
+                <a:gridCol w="4260300">
+                  <a:extLst>
+                    <a:ext uri="{9D8B030D-6E8A-4147-A177-3AD203B41FA5}">
+                      <a16:colId xmlns:a16="http://schemas.microsoft.com/office/drawing/2014/main" val="20001"/>
+                    </a:ext>
+                  </a:extLst>
+                </a:gridCol>
+              </a:tblGrid>
+              <a:tr h="381000">
+                <a:tc>
+                  <a:txBody>
+                    <a:bodyPr/>
+                    <a:lstStyle/>
+                    <a:p>
+                      <a:pPr marL="0" lvl="0" indent="0" algn="l" rtl="0">
+                        <a:spcBef>
+                          <a:spcPts val="0"/>
+                        </a:spcBef>
+                        <a:spcAft>
+                          <a:spcPts val="0"/>
+                        </a:spcAft>
+                        <a:buNone/>
+                      </a:pPr>
+                      <a:r>
+                        <a:rPr lang="en" sz="1800" b="1" dirty="0"/>
+                        <a:t>Test Case </a:t>
+                      </a:r>
+                      <a:endParaRPr sz="1800" b="1" dirty="0"/>
+                    </a:p>
+                  </a:txBody>
+                  <a:tcPr marL="91425" marR="91425" marT="91425" marB="91425">
+                    <a:solidFill>
+                      <a:srgbClr val="CCCCCC"/>
+                    </a:solidFill>
+                  </a:tcPr>
+                </a:tc>
+                <a:tc>
+                  <a:txBody>
+                    <a:bodyPr/>
+                    <a:lstStyle/>
+                    <a:p>
+                      <a:pPr marL="0" lvl="0" indent="0" algn="l" rtl="0">
+                        <a:spcBef>
+                          <a:spcPts val="0"/>
+                        </a:spcBef>
+                        <a:spcAft>
+                          <a:spcPts val="0"/>
+                        </a:spcAft>
+                        <a:buNone/>
+                      </a:pPr>
+                      <a:r>
+                        <a:rPr lang="en" sz="1800" b="1"/>
+                        <a:t>Expected Values</a:t>
+                      </a:r>
+                      <a:endParaRPr sz="1800" b="1"/>
+                    </a:p>
+                  </a:txBody>
+                  <a:tcPr marL="91425" marR="91425" marT="91425" marB="91425">
+                    <a:solidFill>
+                      <a:srgbClr val="CCCCCC"/>
+                    </a:solidFill>
+                  </a:tcPr>
+                </a:tc>
+                <a:extLst>
+                  <a:ext uri="{0D108BD9-81ED-4DB2-BD59-A6C34878D82A}">
+                    <a16:rowId xmlns:a16="http://schemas.microsoft.com/office/drawing/2014/main" val="10000"/>
+                  </a:ext>
+                </a:extLst>
+              </a:tr>
+              <a:tr h="396200">
+                <a:tc>
+                  <a:txBody>
+                    <a:bodyPr/>
+                    <a:lstStyle/>
+                    <a:p>
+                      <a:pPr marL="0" lvl="0" indent="0" algn="l" rtl="0">
+                        <a:spcBef>
+                          <a:spcPts val="0"/>
+                        </a:spcBef>
+                        <a:spcAft>
+                          <a:spcPts val="0"/>
+                        </a:spcAft>
+                        <a:buNone/>
+                      </a:pPr>
+                      <a:r>
+                        <a:rPr lang="en-NZ" sz="1800" dirty="0"/>
+                        <a:t>Run program</a:t>
+                      </a:r>
+                    </a:p>
+                  </a:txBody>
+                  <a:tcPr marL="91425" marR="91425" marT="91425" marB="91425"/>
+                </a:tc>
+                <a:tc>
+                  <a:txBody>
+                    <a:bodyPr/>
+                    <a:lstStyle/>
+                    <a:p>
+                      <a:pPr marL="0" marR="0" lvl="0" indent="0" algn="l" defTabSz="914400" rtl="0" eaLnBrk="1" fontAlgn="auto" latinLnBrk="0" hangingPunct="1">
+                        <a:lnSpc>
+                          <a:spcPct val="100000"/>
+                        </a:lnSpc>
+                        <a:spcBef>
+                          <a:spcPts val="0"/>
+                        </a:spcBef>
+                        <a:spcAft>
+                          <a:spcPts val="0"/>
+                        </a:spcAft>
+                        <a:buClr>
+                          <a:srgbClr val="000000"/>
+                        </a:buClr>
+                        <a:buSzTx/>
+                        <a:buFont typeface="Arial"/>
+                        <a:buNone/>
+                        <a:tabLst/>
+                        <a:defRPr/>
+                      </a:pPr>
+                      <a:r>
+                        <a:rPr lang="en-US" sz="1800" dirty="0"/>
+                        <a:t>Enter 1 program prints pickup</a:t>
+                      </a:r>
+                    </a:p>
+                    <a:p>
+                      <a:pPr marL="0" lvl="0" indent="0" algn="l" rtl="0">
+                        <a:spcBef>
+                          <a:spcPts val="0"/>
+                        </a:spcBef>
+                        <a:spcAft>
+                          <a:spcPts val="0"/>
+                        </a:spcAft>
+                        <a:buNone/>
+                      </a:pPr>
+                      <a:r>
+                        <a:rPr lang="en-US" sz="1800" dirty="0"/>
+                        <a:t>Enter 2 program prints delivery </a:t>
+                      </a:r>
+                    </a:p>
+                    <a:p>
+                      <a:pPr marL="0" lvl="0" indent="0" algn="l" rtl="0">
+                        <a:spcBef>
+                          <a:spcPts val="0"/>
+                        </a:spcBef>
+                        <a:spcAft>
+                          <a:spcPts val="0"/>
+                        </a:spcAft>
+                        <a:buNone/>
+                      </a:pPr>
+                      <a:r>
+                        <a:rPr lang="en-US" sz="1800" dirty="0"/>
+                        <a:t>Enter invalid program displays value error</a:t>
+                      </a:r>
+                    </a:p>
+                    <a:p>
+                      <a:pPr marL="0" lvl="0" indent="0" algn="l" rtl="0">
+                        <a:spcBef>
+                          <a:spcPts val="0"/>
+                        </a:spcBef>
+                        <a:spcAft>
+                          <a:spcPts val="0"/>
+                        </a:spcAft>
+                        <a:buNone/>
+                      </a:pPr>
+                      <a:endParaRPr lang="en-US" sz="1800" dirty="0"/>
+                    </a:p>
+                  </a:txBody>
+                  <a:tcPr marL="91425" marR="91425" marT="91425" marB="91425"/>
+                </a:tc>
+                <a:extLst>
+                  <a:ext uri="{0D108BD9-81ED-4DB2-BD59-A6C34878D82A}">
+                    <a16:rowId xmlns:a16="http://schemas.microsoft.com/office/drawing/2014/main" val="10001"/>
+                  </a:ext>
+                </a:extLst>
+              </a:tr>
+            </a:tbl>
+          </a:graphicData>
+        </a:graphic>
+      </p:graphicFrame>
+      <p:pic>
+        <p:nvPicPr>
+          <p:cNvPr id="3" name="Picture 2">
+            <a:extLst>
+              <a:ext uri="{FF2B5EF4-FFF2-40B4-BE49-F238E27FC236}">
+                <a16:creationId xmlns:a16="http://schemas.microsoft.com/office/drawing/2014/main" id="{DB7B73FB-54E5-4EEE-A858-02EAADEFA2A5}"/>
+              </a:ext>
+            </a:extLst>
+          </p:cNvPr>
+          <p:cNvPicPr>
+            <a:picLocks noChangeAspect="1"/>
+          </p:cNvPicPr>
+          <p:nvPr/>
+        </p:nvPicPr>
+        <p:blipFill>
+          <a:blip r:embed="rId3"/>
+          <a:stretch>
+            <a:fillRect/>
+          </a:stretch>
+        </p:blipFill>
+        <p:spPr>
+          <a:xfrm>
+            <a:off x="2455641" y="1017725"/>
+            <a:ext cx="3469373" cy="2185906"/>
+          </a:xfrm>
+          <a:prstGeom prst="rect">
+            <a:avLst/>
+          </a:prstGeom>
+        </p:spPr>
+      </p:pic>
+    </p:spTree>
+    <p:extLst>
+      <p:ext uri="{BB962C8B-B14F-4D97-AF65-F5344CB8AC3E}">
+        <p14:creationId xmlns:p14="http://schemas.microsoft.com/office/powerpoint/2010/main" val="1549901026"/>
+      </p:ext>
+    </p:extLst>
+  </p:cSld>
+  <p:clrMapOvr>
+    <a:masterClrMapping/>
+  </p:clrMapOvr>
+</p:sld>
+</file>
+
+<file path=ppt/slides/slide11.xml><?xml version="1.0" encoding="utf-8"?>
+<p:sld xmlns:a="http://schemas.openxmlformats.org/drawingml/2006/main" xmlns:r="http://schemas.openxmlformats.org/officeDocument/2006/relationships" xmlns:p="http://schemas.openxmlformats.org/presentationml/2006/main">
+  <p:cSld>
+    <p:spTree>
+      <p:nvGrpSpPr>
+        <p:cNvPr id="1" name="Shape 77"/>
+        <p:cNvGrpSpPr/>
+        <p:nvPr/>
+      </p:nvGrpSpPr>
+      <p:grpSpPr>
+        <a:xfrm>
+          <a:off x="0" y="0"/>
+          <a:ext cx="0" cy="0"/>
+          <a:chOff x="0" y="0"/>
+          <a:chExt cx="0" cy="0"/>
+        </a:xfrm>
+      </p:grpSpPr>
+      <p:sp>
+        <p:nvSpPr>
+          <p:cNvPr id="78" name="Google Shape;78;p17"/>
+          <p:cNvSpPr txBox="1">
+            <a:spLocks noGrp="1"/>
+          </p:cNvSpPr>
+          <p:nvPr>
+            <p:ph type="title"/>
+          </p:nvPr>
+        </p:nvSpPr>
+        <p:spPr>
+          <a:xfrm>
+            <a:off x="311700" y="117922"/>
+            <a:ext cx="8520600" cy="572700"/>
+          </a:xfrm>
+          <a:prstGeom prst="rect">
+            <a:avLst/>
+          </a:prstGeom>
+        </p:spPr>
+        <p:txBody>
+          <a:bodyPr spcFirstLastPara="1" wrap="square" lIns="91425" tIns="91425" rIns="91425" bIns="91425" anchor="t" anchorCtr="0">
+            <a:noAutofit/>
+          </a:bodyPr>
+          <a:lstStyle/>
+          <a:p>
+            <a:pPr marL="0" lvl="0" indent="0" algn="l" rtl="0">
+              <a:spcBef>
+                <a:spcPts val="0"/>
+              </a:spcBef>
+              <a:spcAft>
+                <a:spcPts val="0"/>
+              </a:spcAft>
+              <a:buNone/>
+            </a:pPr>
+            <a:r>
+              <a:rPr lang="en" dirty="0"/>
+              <a:t>Component 2 version 4 - Test Plan (?and screenshot)</a:t>
+            </a:r>
+            <a:endParaRPr dirty="0"/>
+          </a:p>
+        </p:txBody>
+      </p:sp>
+      <p:graphicFrame>
+        <p:nvGraphicFramePr>
+          <p:cNvPr id="79" name="Google Shape;79;p17"/>
+          <p:cNvGraphicFramePr/>
+          <p:nvPr>
+            <p:extLst>
+              <p:ext uri="{D42A27DB-BD31-4B8C-83A1-F6EECF244321}">
+                <p14:modId xmlns:p14="http://schemas.microsoft.com/office/powerpoint/2010/main" val="3709741858"/>
+              </p:ext>
+            </p:extLst>
+          </p:nvPr>
+        </p:nvGraphicFramePr>
+        <p:xfrm>
+          <a:off x="237359" y="2985013"/>
+          <a:ext cx="8520600" cy="2560260"/>
+        </p:xfrm>
+        <a:graphic>
+          <a:graphicData uri="http://schemas.openxmlformats.org/drawingml/2006/table">
+            <a:tbl>
+              <a:tblPr>
+                <a:noFill/>
+                <a:tableStyleId>{E1099E06-0E6B-448D-9D27-60429F06E6F4}</a:tableStyleId>
+              </a:tblPr>
+              <a:tblGrid>
+                <a:gridCol w="4260300">
+                  <a:extLst>
+                    <a:ext uri="{9D8B030D-6E8A-4147-A177-3AD203B41FA5}">
+                      <a16:colId xmlns:a16="http://schemas.microsoft.com/office/drawing/2014/main" val="20000"/>
+                    </a:ext>
+                  </a:extLst>
+                </a:gridCol>
+                <a:gridCol w="4260300">
+                  <a:extLst>
+                    <a:ext uri="{9D8B030D-6E8A-4147-A177-3AD203B41FA5}">
+                      <a16:colId xmlns:a16="http://schemas.microsoft.com/office/drawing/2014/main" val="20001"/>
+                    </a:ext>
+                  </a:extLst>
+                </a:gridCol>
+              </a:tblGrid>
+              <a:tr h="264794">
+                <a:tc>
+                  <a:txBody>
+                    <a:bodyPr/>
+                    <a:lstStyle/>
+                    <a:p>
+                      <a:pPr marL="0" lvl="0" indent="0" algn="l" rtl="0">
+                        <a:spcBef>
+                          <a:spcPts val="0"/>
+                        </a:spcBef>
+                        <a:spcAft>
+                          <a:spcPts val="0"/>
+                        </a:spcAft>
+                        <a:buNone/>
+                      </a:pPr>
+                      <a:r>
+                        <a:rPr lang="en" sz="1800" b="1" dirty="0"/>
+                        <a:t>Test Case </a:t>
+                      </a:r>
+                      <a:endParaRPr sz="1800" b="1" dirty="0"/>
+                    </a:p>
+                  </a:txBody>
+                  <a:tcPr marL="91425" marR="91425" marT="91425" marB="91425">
+                    <a:solidFill>
+                      <a:srgbClr val="CCCCCC"/>
+                    </a:solidFill>
+                  </a:tcPr>
+                </a:tc>
+                <a:tc>
+                  <a:txBody>
+                    <a:bodyPr/>
+                    <a:lstStyle/>
+                    <a:p>
+                      <a:pPr marL="0" lvl="0" indent="0" algn="l" rtl="0">
+                        <a:spcBef>
+                          <a:spcPts val="0"/>
+                        </a:spcBef>
+                        <a:spcAft>
+                          <a:spcPts val="0"/>
+                        </a:spcAft>
+                        <a:buNone/>
+                      </a:pPr>
+                      <a:r>
+                        <a:rPr lang="en" sz="1800" b="1"/>
+                        <a:t>Expected Values</a:t>
+                      </a:r>
+                      <a:endParaRPr sz="1800" b="1"/>
+                    </a:p>
+                  </a:txBody>
+                  <a:tcPr marL="91425" marR="91425" marT="91425" marB="91425">
+                    <a:solidFill>
+                      <a:srgbClr val="CCCCCC"/>
+                    </a:solidFill>
+                  </a:tcPr>
+                </a:tc>
+                <a:extLst>
+                  <a:ext uri="{0D108BD9-81ED-4DB2-BD59-A6C34878D82A}">
+                    <a16:rowId xmlns:a16="http://schemas.microsoft.com/office/drawing/2014/main" val="10000"/>
+                  </a:ext>
+                </a:extLst>
+              </a:tr>
+              <a:tr h="1218115">
+                <a:tc>
+                  <a:txBody>
+                    <a:bodyPr/>
+                    <a:lstStyle/>
+                    <a:p>
+                      <a:pPr marL="0" lvl="0" indent="0" algn="l" rtl="0">
+                        <a:spcBef>
+                          <a:spcPts val="0"/>
+                        </a:spcBef>
+                        <a:spcAft>
+                          <a:spcPts val="0"/>
+                        </a:spcAft>
+                        <a:buNone/>
+                      </a:pPr>
+                      <a:r>
+                        <a:rPr lang="en-NZ" sz="1800" dirty="0"/>
+                        <a:t>Run program</a:t>
+                      </a:r>
+                    </a:p>
+                  </a:txBody>
+                  <a:tcPr marL="91425" marR="91425" marT="91425" marB="91425"/>
+                </a:tc>
+                <a:tc>
+                  <a:txBody>
+                    <a:bodyPr/>
+                    <a:lstStyle/>
+                    <a:p>
+                      <a:pPr marL="0" marR="0" lvl="0" indent="0" algn="l" defTabSz="914400" rtl="0" eaLnBrk="1" fontAlgn="auto" latinLnBrk="0" hangingPunct="1">
+                        <a:lnSpc>
+                          <a:spcPct val="100000"/>
+                        </a:lnSpc>
+                        <a:spcBef>
+                          <a:spcPts val="0"/>
+                        </a:spcBef>
+                        <a:spcAft>
+                          <a:spcPts val="0"/>
+                        </a:spcAft>
+                        <a:buClr>
+                          <a:srgbClr val="000000"/>
+                        </a:buClr>
+                        <a:buSzTx/>
+                        <a:buFont typeface="Arial"/>
+                        <a:buNone/>
+                        <a:tabLst/>
+                        <a:defRPr/>
+                      </a:pPr>
+                      <a:r>
+                        <a:rPr lang="en-US" sz="1800" dirty="0"/>
+                        <a:t>Enter 1 program prints pickup</a:t>
+                      </a:r>
+                    </a:p>
+                    <a:p>
+                      <a:pPr marL="0" lvl="0" indent="0" algn="l" rtl="0">
+                        <a:spcBef>
+                          <a:spcPts val="0"/>
+                        </a:spcBef>
+                        <a:spcAft>
+                          <a:spcPts val="0"/>
+                        </a:spcAft>
+                        <a:buNone/>
+                      </a:pPr>
+                      <a:r>
+                        <a:rPr lang="en-US" sz="1800" dirty="0"/>
+                        <a:t>Enter 2 program prints delivery </a:t>
+                      </a:r>
+                    </a:p>
+                    <a:p>
+                      <a:pPr marL="0" lvl="0" indent="0" algn="l" rtl="0">
+                        <a:spcBef>
+                          <a:spcPts val="0"/>
+                        </a:spcBef>
+                        <a:spcAft>
+                          <a:spcPts val="0"/>
+                        </a:spcAft>
+                        <a:buNone/>
+                      </a:pPr>
+                      <a:r>
+                        <a:rPr lang="en-US" sz="1800" dirty="0"/>
+                        <a:t>Enter invalid program displays value error</a:t>
+                      </a:r>
+                    </a:p>
+                    <a:p>
+                      <a:pPr marL="0" lvl="0" indent="0" algn="l" rtl="0">
+                        <a:spcBef>
+                          <a:spcPts val="0"/>
+                        </a:spcBef>
+                        <a:spcAft>
+                          <a:spcPts val="0"/>
+                        </a:spcAft>
+                        <a:buNone/>
+                      </a:pPr>
+                      <a:r>
+                        <a:rPr lang="en-US" sz="1800" dirty="0"/>
+                        <a:t>Enter number other than 1 or 2 does not work</a:t>
+                      </a:r>
+                    </a:p>
+                    <a:p>
+                      <a:pPr marL="0" lvl="0" indent="0" algn="l" rtl="0">
+                        <a:spcBef>
+                          <a:spcPts val="0"/>
+                        </a:spcBef>
+                        <a:spcAft>
+                          <a:spcPts val="0"/>
+                        </a:spcAft>
+                        <a:buNone/>
+                      </a:pPr>
+                      <a:endParaRPr lang="en-US" sz="1800" dirty="0"/>
+                    </a:p>
+                  </a:txBody>
+                  <a:tcPr marL="91425" marR="91425" marT="91425" marB="91425"/>
+                </a:tc>
+                <a:extLst>
+                  <a:ext uri="{0D108BD9-81ED-4DB2-BD59-A6C34878D82A}">
+                    <a16:rowId xmlns:a16="http://schemas.microsoft.com/office/drawing/2014/main" val="10001"/>
+                  </a:ext>
+                </a:extLst>
+              </a:tr>
+            </a:tbl>
+          </a:graphicData>
+        </a:graphic>
+      </p:graphicFrame>
+      <p:pic>
+        <p:nvPicPr>
+          <p:cNvPr id="4" name="Picture 3">
+            <a:extLst>
+              <a:ext uri="{FF2B5EF4-FFF2-40B4-BE49-F238E27FC236}">
+                <a16:creationId xmlns:a16="http://schemas.microsoft.com/office/drawing/2014/main" id="{57CF45F0-39C7-4E7C-BF08-6249FA424E61}"/>
+              </a:ext>
+            </a:extLst>
+          </p:cNvPr>
+          <p:cNvPicPr>
+            <a:picLocks noChangeAspect="1"/>
+          </p:cNvPicPr>
+          <p:nvPr/>
+        </p:nvPicPr>
+        <p:blipFill>
+          <a:blip r:embed="rId3"/>
+          <a:stretch>
+            <a:fillRect/>
+          </a:stretch>
+        </p:blipFill>
+        <p:spPr>
+          <a:xfrm>
+            <a:off x="2346794" y="636545"/>
+            <a:ext cx="2983489" cy="2400508"/>
+          </a:xfrm>
+          <a:prstGeom prst="rect">
+            <a:avLst/>
+          </a:prstGeom>
+        </p:spPr>
+      </p:pic>
+      <p:pic>
+        <p:nvPicPr>
+          <p:cNvPr id="6" name="Picture 5">
+            <a:extLst>
+              <a:ext uri="{FF2B5EF4-FFF2-40B4-BE49-F238E27FC236}">
+                <a16:creationId xmlns:a16="http://schemas.microsoft.com/office/drawing/2014/main" id="{8445A261-316E-4722-BB93-DDC7629B61A3}"/>
+              </a:ext>
+            </a:extLst>
+          </p:cNvPr>
+          <p:cNvPicPr>
+            <a:picLocks noChangeAspect="1"/>
+          </p:cNvPicPr>
+          <p:nvPr/>
+        </p:nvPicPr>
+        <p:blipFill>
+          <a:blip r:embed="rId4"/>
+          <a:stretch>
+            <a:fillRect/>
+          </a:stretch>
+        </p:blipFill>
+        <p:spPr>
+          <a:xfrm>
+            <a:off x="5480406" y="593093"/>
+            <a:ext cx="2801233" cy="2443960"/>
+          </a:xfrm>
+          <a:prstGeom prst="rect">
+            <a:avLst/>
+          </a:prstGeom>
+        </p:spPr>
+      </p:pic>
+    </p:spTree>
+    <p:extLst>
+      <p:ext uri="{BB962C8B-B14F-4D97-AF65-F5344CB8AC3E}">
+        <p14:creationId xmlns:p14="http://schemas.microsoft.com/office/powerpoint/2010/main" val="1024250125"/>
+      </p:ext>
+    </p:extLst>
+  </p:cSld>
+  <p:clrMapOvr>
+    <a:masterClrMapping/>
+  </p:clrMapOvr>
+</p:sld>
+</file>
+
+<file path=ppt/slides/slide12.xml><?xml version="1.0" encoding="utf-8"?>
+<p:sld xmlns:a="http://schemas.openxmlformats.org/drawingml/2006/main" xmlns:r="http://schemas.openxmlformats.org/officeDocument/2006/relationships" xmlns:p="http://schemas.openxmlformats.org/presentationml/2006/main">
+  <p:cSld>
+    <p:spTree>
+      <p:nvGrpSpPr>
+        <p:cNvPr id="1" name="Shape 77"/>
+        <p:cNvGrpSpPr/>
+        <p:nvPr/>
+      </p:nvGrpSpPr>
+      <p:grpSpPr>
+        <a:xfrm>
+          <a:off x="0" y="0"/>
+          <a:ext cx="0" cy="0"/>
+          <a:chOff x="0" y="0"/>
+          <a:chExt cx="0" cy="0"/>
+        </a:xfrm>
+      </p:grpSpPr>
+      <p:sp>
+        <p:nvSpPr>
+          <p:cNvPr id="78" name="Google Shape;78;p17"/>
+          <p:cNvSpPr txBox="1">
+            <a:spLocks noGrp="1"/>
+          </p:cNvSpPr>
+          <p:nvPr>
+            <p:ph type="title"/>
+          </p:nvPr>
+        </p:nvSpPr>
+        <p:spPr>
+          <a:xfrm>
+            <a:off x="311700" y="117922"/>
+            <a:ext cx="8520600" cy="572700"/>
+          </a:xfrm>
+          <a:prstGeom prst="rect">
+            <a:avLst/>
+          </a:prstGeom>
+        </p:spPr>
+        <p:txBody>
+          <a:bodyPr spcFirstLastPara="1" wrap="square" lIns="91425" tIns="91425" rIns="91425" bIns="91425" anchor="t" anchorCtr="0">
+            <a:noAutofit/>
+          </a:bodyPr>
+          <a:lstStyle/>
+          <a:p>
+            <a:pPr marL="0" lvl="0" indent="0" algn="l" rtl="0">
+              <a:spcBef>
+                <a:spcPts val="0"/>
+              </a:spcBef>
+              <a:spcAft>
+                <a:spcPts val="0"/>
+              </a:spcAft>
+              <a:buNone/>
+            </a:pPr>
+            <a:r>
+              <a:rPr lang="en" dirty="0"/>
+              <a:t>Component 2 version 5 - Test Plan (?and screenshot)</a:t>
+            </a:r>
+            <a:endParaRPr dirty="0"/>
+          </a:p>
+        </p:txBody>
+      </p:sp>
+      <p:graphicFrame>
+        <p:nvGraphicFramePr>
+          <p:cNvPr id="79" name="Google Shape;79;p17"/>
+          <p:cNvGraphicFramePr/>
+          <p:nvPr>
+            <p:extLst>
+              <p:ext uri="{D42A27DB-BD31-4B8C-83A1-F6EECF244321}">
+                <p14:modId xmlns:p14="http://schemas.microsoft.com/office/powerpoint/2010/main" val="1420590186"/>
+              </p:ext>
+            </p:extLst>
+          </p:nvPr>
+        </p:nvGraphicFramePr>
+        <p:xfrm>
+          <a:off x="791470" y="2995962"/>
+          <a:ext cx="7561060" cy="2560260"/>
+        </p:xfrm>
+        <a:graphic>
+          <a:graphicData uri="http://schemas.openxmlformats.org/drawingml/2006/table">
+            <a:tbl>
+              <a:tblPr>
+                <a:noFill/>
+                <a:tableStyleId>{E1099E06-0E6B-448D-9D27-60429F06E6F4}</a:tableStyleId>
+              </a:tblPr>
+              <a:tblGrid>
+                <a:gridCol w="3780530">
+                  <a:extLst>
+                    <a:ext uri="{9D8B030D-6E8A-4147-A177-3AD203B41FA5}">
+                      <a16:colId xmlns:a16="http://schemas.microsoft.com/office/drawing/2014/main" val="20000"/>
+                    </a:ext>
+                  </a:extLst>
+                </a:gridCol>
+                <a:gridCol w="3780530">
+                  <a:extLst>
+                    <a:ext uri="{9D8B030D-6E8A-4147-A177-3AD203B41FA5}">
+                      <a16:colId xmlns:a16="http://schemas.microsoft.com/office/drawing/2014/main" val="20001"/>
+                    </a:ext>
+                  </a:extLst>
+                </a:gridCol>
+              </a:tblGrid>
+              <a:tr h="372195">
+                <a:tc>
+                  <a:txBody>
+                    <a:bodyPr/>
+                    <a:lstStyle/>
+                    <a:p>
+                      <a:pPr marL="0" lvl="0" indent="0" algn="l" rtl="0">
+                        <a:spcBef>
+                          <a:spcPts val="0"/>
+                        </a:spcBef>
+                        <a:spcAft>
+                          <a:spcPts val="0"/>
+                        </a:spcAft>
+                        <a:buNone/>
+                      </a:pPr>
+                      <a:r>
+                        <a:rPr lang="en" sz="1800" b="1" dirty="0"/>
+                        <a:t>Test Case </a:t>
+                      </a:r>
+                      <a:endParaRPr sz="1800" b="1" dirty="0"/>
+                    </a:p>
+                  </a:txBody>
+                  <a:tcPr marL="91425" marR="91425" marT="91425" marB="91425">
+                    <a:solidFill>
+                      <a:srgbClr val="CCCCCC"/>
+                    </a:solidFill>
+                  </a:tcPr>
+                </a:tc>
+                <a:tc>
+                  <a:txBody>
+                    <a:bodyPr/>
+                    <a:lstStyle/>
+                    <a:p>
+                      <a:pPr marL="0" lvl="0" indent="0" algn="l" rtl="0">
+                        <a:spcBef>
+                          <a:spcPts val="0"/>
+                        </a:spcBef>
+                        <a:spcAft>
+                          <a:spcPts val="0"/>
+                        </a:spcAft>
+                        <a:buNone/>
+                      </a:pPr>
+                      <a:r>
+                        <a:rPr lang="en" sz="1800" b="1" dirty="0"/>
+                        <a:t>Expected Values</a:t>
+                      </a:r>
+                      <a:endParaRPr sz="1800" b="1" dirty="0"/>
+                    </a:p>
+                  </a:txBody>
+                  <a:tcPr marL="91425" marR="91425" marT="91425" marB="91425">
+                    <a:solidFill>
+                      <a:srgbClr val="CCCCCC"/>
+                    </a:solidFill>
+                  </a:tcPr>
+                </a:tc>
+                <a:extLst>
+                  <a:ext uri="{0D108BD9-81ED-4DB2-BD59-A6C34878D82A}">
+                    <a16:rowId xmlns:a16="http://schemas.microsoft.com/office/drawing/2014/main" val="10000"/>
+                  </a:ext>
+                </a:extLst>
+              </a:tr>
+              <a:tr h="1712185">
+                <a:tc>
+                  <a:txBody>
+                    <a:bodyPr/>
+                    <a:lstStyle/>
+                    <a:p>
+                      <a:pPr marL="0" lvl="0" indent="0" algn="l" rtl="0">
+                        <a:spcBef>
+                          <a:spcPts val="0"/>
+                        </a:spcBef>
+                        <a:spcAft>
+                          <a:spcPts val="0"/>
+                        </a:spcAft>
+                        <a:buNone/>
+                      </a:pPr>
+                      <a:r>
+                        <a:rPr lang="en-NZ" sz="1800" dirty="0"/>
+                        <a:t>Run program</a:t>
+                      </a:r>
+                    </a:p>
+                  </a:txBody>
+                  <a:tcPr marL="91425" marR="91425" marT="91425" marB="91425"/>
+                </a:tc>
+                <a:tc>
+                  <a:txBody>
+                    <a:bodyPr/>
+                    <a:lstStyle/>
+                    <a:p>
+                      <a:pPr marL="0" marR="0" lvl="0" indent="0" algn="l" defTabSz="914400" rtl="0" eaLnBrk="1" fontAlgn="auto" latinLnBrk="0" hangingPunct="1">
+                        <a:lnSpc>
+                          <a:spcPct val="100000"/>
+                        </a:lnSpc>
+                        <a:spcBef>
+                          <a:spcPts val="0"/>
+                        </a:spcBef>
+                        <a:spcAft>
+                          <a:spcPts val="0"/>
+                        </a:spcAft>
+                        <a:buClr>
+                          <a:srgbClr val="000000"/>
+                        </a:buClr>
+                        <a:buSzTx/>
+                        <a:buFont typeface="Arial"/>
+                        <a:buNone/>
+                        <a:tabLst/>
+                        <a:defRPr/>
+                      </a:pPr>
+                      <a:r>
+                        <a:rPr lang="en-US" sz="1800" dirty="0"/>
+                        <a:t>Enter 1 program prints pickup</a:t>
+                      </a:r>
+                    </a:p>
+                    <a:p>
+                      <a:pPr marL="0" lvl="0" indent="0" algn="l" rtl="0">
+                        <a:spcBef>
+                          <a:spcPts val="0"/>
+                        </a:spcBef>
+                        <a:spcAft>
+                          <a:spcPts val="0"/>
+                        </a:spcAft>
+                        <a:buNone/>
+                      </a:pPr>
+                      <a:r>
+                        <a:rPr lang="en-US" sz="1800" dirty="0"/>
+                        <a:t>Enter 2 program prints delivery </a:t>
+                      </a:r>
+                    </a:p>
+                    <a:p>
+                      <a:pPr marL="0" lvl="0" indent="0" algn="l" rtl="0">
+                        <a:spcBef>
+                          <a:spcPts val="0"/>
+                        </a:spcBef>
+                        <a:spcAft>
+                          <a:spcPts val="0"/>
+                        </a:spcAft>
+                        <a:buNone/>
+                      </a:pPr>
+                      <a:r>
+                        <a:rPr lang="en-US" sz="1800" dirty="0"/>
+                        <a:t>Enter invalid program displays value error</a:t>
+                      </a:r>
+                    </a:p>
+                    <a:p>
+                      <a:pPr marL="0" lvl="0" indent="0" algn="l" rtl="0">
+                        <a:spcBef>
+                          <a:spcPts val="0"/>
+                        </a:spcBef>
+                        <a:spcAft>
+                          <a:spcPts val="0"/>
+                        </a:spcAft>
+                        <a:buNone/>
+                      </a:pPr>
+                      <a:r>
+                        <a:rPr lang="en-US" sz="1800" dirty="0"/>
+                        <a:t>Enter number other than 1 or 2 does not work</a:t>
+                      </a:r>
+                    </a:p>
+                    <a:p>
+                      <a:pPr marL="0" lvl="0" indent="0" algn="l" rtl="0">
+                        <a:spcBef>
+                          <a:spcPts val="0"/>
+                        </a:spcBef>
+                        <a:spcAft>
+                          <a:spcPts val="0"/>
+                        </a:spcAft>
+                        <a:buNone/>
+                      </a:pPr>
+                      <a:endParaRPr lang="en-US" sz="1800" dirty="0"/>
+                    </a:p>
+                  </a:txBody>
+                  <a:tcPr marL="91425" marR="91425" marT="91425" marB="91425"/>
+                </a:tc>
+                <a:extLst>
+                  <a:ext uri="{0D108BD9-81ED-4DB2-BD59-A6C34878D82A}">
+                    <a16:rowId xmlns:a16="http://schemas.microsoft.com/office/drawing/2014/main" val="10001"/>
+                  </a:ext>
+                </a:extLst>
+              </a:tr>
+            </a:tbl>
+          </a:graphicData>
+        </a:graphic>
+      </p:graphicFrame>
+      <p:pic>
+        <p:nvPicPr>
+          <p:cNvPr id="3" name="Picture 2">
+            <a:extLst>
+              <a:ext uri="{FF2B5EF4-FFF2-40B4-BE49-F238E27FC236}">
+                <a16:creationId xmlns:a16="http://schemas.microsoft.com/office/drawing/2014/main" id="{DC1BBAB8-C482-4F89-9E01-214718EDBD3C}"/>
+              </a:ext>
+            </a:extLst>
+          </p:cNvPr>
+          <p:cNvPicPr>
+            <a:picLocks noChangeAspect="1"/>
+          </p:cNvPicPr>
+          <p:nvPr/>
+        </p:nvPicPr>
+        <p:blipFill>
+          <a:blip r:embed="rId3"/>
+          <a:stretch>
+            <a:fillRect/>
+          </a:stretch>
+        </p:blipFill>
+        <p:spPr>
+          <a:xfrm>
+            <a:off x="2572533" y="579864"/>
+            <a:ext cx="2723541" cy="2416098"/>
+          </a:xfrm>
+          <a:prstGeom prst="rect">
+            <a:avLst/>
+          </a:prstGeom>
+        </p:spPr>
+      </p:pic>
+    </p:spTree>
+    <p:extLst>
+      <p:ext uri="{BB962C8B-B14F-4D97-AF65-F5344CB8AC3E}">
+        <p14:creationId xmlns:p14="http://schemas.microsoft.com/office/powerpoint/2010/main" val="568495832"/>
+      </p:ext>
+    </p:extLst>
+  </p:cSld>
+  <p:clrMapOvr>
+    <a:masterClrMapping/>
+  </p:clrMapOvr>
+</p:sld>
+</file>
+
+<file path=ppt/slides/slide13.xml><?xml version="1.0" encoding="utf-8"?>
+<p:sld xmlns:a="http://schemas.openxmlformats.org/drawingml/2006/main" xmlns:r="http://schemas.openxmlformats.org/officeDocument/2006/relationships" xmlns:p="http://schemas.openxmlformats.org/presentationml/2006/main">
+  <p:cSld>
+    <p:bg>
+      <p:bgPr>
+        <a:solidFill>
+          <a:srgbClr val="D9EAD3"/>
+        </a:solidFill>
+        <a:effectLst/>
+      </p:bgPr>
+    </p:bg>
+    <p:spTree>
+      <p:nvGrpSpPr>
+        <p:cNvPr id="1" name="Shape 72"/>
+        <p:cNvGrpSpPr/>
+        <p:nvPr/>
+      </p:nvGrpSpPr>
+      <p:grpSpPr>
+        <a:xfrm>
+          <a:off x="0" y="0"/>
+          <a:ext cx="0" cy="0"/>
+          <a:chOff x="0" y="0"/>
+          <a:chExt cx="0" cy="0"/>
+        </a:xfrm>
+      </p:grpSpPr>
+      <p:sp>
+        <p:nvSpPr>
+          <p:cNvPr id="73" name="Google Shape;73;p16"/>
+          <p:cNvSpPr txBox="1">
+            <a:spLocks noGrp="1"/>
+          </p:cNvSpPr>
+          <p:nvPr>
+            <p:ph type="title"/>
+          </p:nvPr>
+        </p:nvSpPr>
+        <p:spPr>
+          <a:xfrm>
+            <a:off x="311700" y="445025"/>
+            <a:ext cx="8520600" cy="572700"/>
+          </a:xfrm>
+          <a:prstGeom prst="rect">
+            <a:avLst/>
+          </a:prstGeom>
+        </p:spPr>
+        <p:txBody>
+          <a:bodyPr spcFirstLastPara="1" wrap="square" lIns="91425" tIns="91425" rIns="91425" bIns="91425" anchor="t" anchorCtr="0">
+            <a:noAutofit/>
+          </a:bodyPr>
+          <a:lstStyle/>
+          <a:p>
+            <a:pPr marL="0" lvl="0" indent="0" algn="l" rtl="0">
+              <a:spcBef>
+                <a:spcPts val="0"/>
+              </a:spcBef>
+              <a:spcAft>
+                <a:spcPts val="0"/>
+              </a:spcAft>
+              <a:buNone/>
+            </a:pPr>
+            <a:r>
+              <a:rPr lang="en" dirty="0"/>
+              <a:t>Component 2 (Trello screenshot)</a:t>
+            </a:r>
+            <a:endParaRPr dirty="0"/>
+          </a:p>
+        </p:txBody>
+      </p:sp>
+    </p:spTree>
+    <p:extLst>
+      <p:ext uri="{BB962C8B-B14F-4D97-AF65-F5344CB8AC3E}">
+        <p14:creationId xmlns:p14="http://schemas.microsoft.com/office/powerpoint/2010/main" val="2298535692"/>
+      </p:ext>
+    </p:extLst>
+  </p:cSld>
+  <p:clrMapOvr>
+    <a:masterClrMapping/>
+  </p:clrMapOvr>
+</p:sld>
+</file>
+
+<file path=ppt/slides/slide14.xml><?xml version="1.0" encoding="utf-8"?>
+<p:sld xmlns:a="http://schemas.openxmlformats.org/drawingml/2006/main" xmlns:r="http://schemas.openxmlformats.org/officeDocument/2006/relationships" xmlns:p="http://schemas.openxmlformats.org/presentationml/2006/main">
+  <p:cSld>
+    <p:bg>
+      <p:bgPr>
+        <a:solidFill>
+          <a:srgbClr val="D9EAD3"/>
+        </a:solidFill>
+        <a:effectLst/>
+      </p:bgPr>
+    </p:bg>
+    <p:spTree>
+      <p:nvGrpSpPr>
+        <p:cNvPr id="1" name="Shape 83"/>
+        <p:cNvGrpSpPr/>
+        <p:nvPr/>
+      </p:nvGrpSpPr>
+      <p:grpSpPr>
+        <a:xfrm>
+          <a:off x="0" y="0"/>
+          <a:ext cx="0" cy="0"/>
+          <a:chOff x="0" y="0"/>
+          <a:chExt cx="0" cy="0"/>
+        </a:xfrm>
+      </p:grpSpPr>
+      <p:sp>
+        <p:nvSpPr>
+          <p:cNvPr id="84" name="Google Shape;84;p18"/>
+          <p:cNvSpPr txBox="1">
+            <a:spLocks noGrp="1"/>
+          </p:cNvSpPr>
+          <p:nvPr>
+            <p:ph type="title"/>
+          </p:nvPr>
+        </p:nvSpPr>
+        <p:spPr>
+          <a:xfrm>
+            <a:off x="311700" y="445025"/>
+            <a:ext cx="8520600" cy="572700"/>
+          </a:xfrm>
+          <a:prstGeom prst="rect">
+            <a:avLst/>
+          </a:prstGeom>
+        </p:spPr>
+        <p:txBody>
+          <a:bodyPr spcFirstLastPara="1" wrap="square" lIns="91425" tIns="91425" rIns="91425" bIns="91425" anchor="t" anchorCtr="0">
+            <a:noAutofit/>
+          </a:bodyPr>
+          <a:lstStyle/>
+          <a:p>
+            <a:pPr marL="0" lvl="0" indent="0" algn="l" rtl="0">
+              <a:spcBef>
+                <a:spcPts val="0"/>
+              </a:spcBef>
+              <a:spcAft>
+                <a:spcPts val="0"/>
+              </a:spcAft>
+              <a:buNone/>
+            </a:pPr>
+            <a:r>
+              <a:rPr lang="en"/>
+              <a:t>Version Control Evidence</a:t>
+            </a:r>
+            <a:endParaRPr/>
+          </a:p>
+        </p:txBody>
+      </p:sp>
+      <p:sp>
+        <p:nvSpPr>
+          <p:cNvPr id="85" name="Google Shape;85;p18"/>
+          <p:cNvSpPr txBox="1">
+            <a:spLocks noGrp="1"/>
+          </p:cNvSpPr>
+          <p:nvPr>
+            <p:ph type="body" idx="1"/>
+          </p:nvPr>
+        </p:nvSpPr>
+        <p:spPr>
+          <a:xfrm>
+            <a:off x="311700" y="1152475"/>
+            <a:ext cx="8464200" cy="3739200"/>
+          </a:xfrm>
+          <a:prstGeom prst="rect">
+            <a:avLst/>
+          </a:prstGeom>
+        </p:spPr>
+        <p:txBody>
+          <a:bodyPr spcFirstLastPara="1" wrap="square" lIns="91425" tIns="91425" rIns="91425" bIns="91425" anchor="t" anchorCtr="0">
+            <a:noAutofit/>
+          </a:bodyPr>
+          <a:lstStyle/>
+          <a:p>
+            <a:pPr marL="0" lvl="0" indent="0" algn="l" rtl="0">
+              <a:spcBef>
+                <a:spcPts val="0"/>
+              </a:spcBef>
+              <a:spcAft>
+                <a:spcPts val="1600"/>
+              </a:spcAft>
+              <a:buNone/>
+            </a:pPr>
+            <a:r>
+              <a:rPr lang="en" i="1"/>
+              <a:t>Your version control evidence should go here.  This could be in the form of annotated screenshots which show you you managed this process or you could make a brief screencast explaining how you implemented version control.</a:t>
+            </a:r>
+            <a:endParaRPr i="1"/>
+          </a:p>
+        </p:txBody>
+      </p:sp>
+    </p:spTree>
+  </p:cSld>
+  <p:clrMapOvr>
+    <a:masterClrMapping/>
+  </p:clrMapOvr>
+</p:sld>
+</file>
+
+<file path=ppt/slides/slide15.xml><?xml version="1.0" encoding="utf-8"?>
+<p:sld xmlns:a="http://schemas.openxmlformats.org/drawingml/2006/main" xmlns:r="http://schemas.openxmlformats.org/officeDocument/2006/relationships" xmlns:p="http://schemas.openxmlformats.org/presentationml/2006/main">
+  <p:cSld>
     <p:bg>
       <p:bgPr>
         <a:solidFill>
@@ -8098,314 +10019,7 @@
             </a:pPr>
             <a:r>
               <a:rPr lang="en" dirty="0"/>
-              <a:t>Component 1 Version 2 - Test Plan (?and screenshot)</a:t>
-            </a:r>
-            <a:endParaRPr dirty="0"/>
-          </a:p>
-        </p:txBody>
-      </p:sp>
-      <p:graphicFrame>
-        <p:nvGraphicFramePr>
-          <p:cNvPr id="79" name="Google Shape;79;p17"/>
-          <p:cNvGraphicFramePr/>
-          <p:nvPr>
-            <p:extLst>
-              <p:ext uri="{D42A27DB-BD31-4B8C-83A1-F6EECF244321}">
-                <p14:modId xmlns:p14="http://schemas.microsoft.com/office/powerpoint/2010/main" val="1020882388"/>
-              </p:ext>
-            </p:extLst>
-          </p:nvPr>
-        </p:nvGraphicFramePr>
-        <p:xfrm>
-          <a:off x="252227" y="3371589"/>
-          <a:ext cx="8520600" cy="1462980"/>
-        </p:xfrm>
-        <a:graphic>
-          <a:graphicData uri="http://schemas.openxmlformats.org/drawingml/2006/table">
-            <a:tbl>
-              <a:tblPr>
-                <a:noFill/>
-                <a:tableStyleId>{E1099E06-0E6B-448D-9D27-60429F06E6F4}</a:tableStyleId>
-              </a:tblPr>
-              <a:tblGrid>
-                <a:gridCol w="4260300">
-                  <a:extLst>
-                    <a:ext uri="{9D8B030D-6E8A-4147-A177-3AD203B41FA5}">
-                      <a16:colId xmlns:a16="http://schemas.microsoft.com/office/drawing/2014/main" val="20000"/>
-                    </a:ext>
-                  </a:extLst>
-                </a:gridCol>
-                <a:gridCol w="4260300">
-                  <a:extLst>
-                    <a:ext uri="{9D8B030D-6E8A-4147-A177-3AD203B41FA5}">
-                      <a16:colId xmlns:a16="http://schemas.microsoft.com/office/drawing/2014/main" val="20001"/>
-                    </a:ext>
-                  </a:extLst>
-                </a:gridCol>
-              </a:tblGrid>
-              <a:tr h="381000">
-                <a:tc>
-                  <a:txBody>
-                    <a:bodyPr/>
-                    <a:lstStyle/>
-                    <a:p>
-                      <a:pPr marL="0" lvl="0" indent="0" algn="l" rtl="0">
-                        <a:spcBef>
-                          <a:spcPts val="0"/>
-                        </a:spcBef>
-                        <a:spcAft>
-                          <a:spcPts val="0"/>
-                        </a:spcAft>
-                        <a:buNone/>
-                      </a:pPr>
-                      <a:r>
-                        <a:rPr lang="en" sz="1800" b="1" dirty="0"/>
-                        <a:t>Test Case </a:t>
-                      </a:r>
-                      <a:endParaRPr sz="1800" b="1" dirty="0"/>
-                    </a:p>
-                  </a:txBody>
-                  <a:tcPr marL="91425" marR="91425" marT="91425" marB="91425">
-                    <a:solidFill>
-                      <a:srgbClr val="CCCCCC"/>
-                    </a:solidFill>
-                  </a:tcPr>
-                </a:tc>
-                <a:tc>
-                  <a:txBody>
-                    <a:bodyPr/>
-                    <a:lstStyle/>
-                    <a:p>
-                      <a:pPr marL="0" lvl="0" indent="0" algn="l" rtl="0">
-                        <a:spcBef>
-                          <a:spcPts val="0"/>
-                        </a:spcBef>
-                        <a:spcAft>
-                          <a:spcPts val="0"/>
-                        </a:spcAft>
-                        <a:buNone/>
-                      </a:pPr>
-                      <a:r>
-                        <a:rPr lang="en" sz="1800" b="1"/>
-                        <a:t>Expected Values</a:t>
-                      </a:r>
-                      <a:endParaRPr sz="1800" b="1"/>
-                    </a:p>
-                  </a:txBody>
-                  <a:tcPr marL="91425" marR="91425" marT="91425" marB="91425">
-                    <a:solidFill>
-                      <a:srgbClr val="CCCCCC"/>
-                    </a:solidFill>
-                  </a:tcPr>
-                </a:tc>
-                <a:extLst>
-                  <a:ext uri="{0D108BD9-81ED-4DB2-BD59-A6C34878D82A}">
-                    <a16:rowId xmlns:a16="http://schemas.microsoft.com/office/drawing/2014/main" val="10000"/>
-                  </a:ext>
-                </a:extLst>
-              </a:tr>
-              <a:tr h="396200">
-                <a:tc>
-                  <a:txBody>
-                    <a:bodyPr/>
-                    <a:lstStyle/>
-                    <a:p>
-                      <a:pPr marL="0" lvl="0" indent="0" algn="l" rtl="0">
-                        <a:spcBef>
-                          <a:spcPts val="0"/>
-                        </a:spcBef>
-                        <a:spcAft>
-                          <a:spcPts val="0"/>
-                        </a:spcAft>
-                        <a:buNone/>
-                      </a:pPr>
-                      <a:r>
-                        <a:rPr lang="en-NZ" sz="1800" dirty="0"/>
-                        <a:t>Run program</a:t>
-                      </a:r>
-                    </a:p>
-                  </a:txBody>
-                  <a:tcPr marL="91425" marR="91425" marT="91425" marB="91425"/>
-                </a:tc>
-                <a:tc>
-                  <a:txBody>
-                    <a:bodyPr/>
-                    <a:lstStyle/>
-                    <a:p>
-                      <a:pPr marL="0" lvl="0" indent="0" algn="l" rtl="0">
-                        <a:spcBef>
-                          <a:spcPts val="0"/>
-                        </a:spcBef>
-                        <a:spcAft>
-                          <a:spcPts val="0"/>
-                        </a:spcAft>
-                        <a:buNone/>
-                      </a:pPr>
-                      <a:r>
-                        <a:rPr lang="en-US" sz="1800" dirty="0"/>
-                        <a:t>Print welcome message with random name from list of names – Runs correctly </a:t>
-                      </a:r>
-                    </a:p>
-                  </a:txBody>
-                  <a:tcPr marL="91425" marR="91425" marT="91425" marB="91425"/>
-                </a:tc>
-                <a:extLst>
-                  <a:ext uri="{0D108BD9-81ED-4DB2-BD59-A6C34878D82A}">
-                    <a16:rowId xmlns:a16="http://schemas.microsoft.com/office/drawing/2014/main" val="10001"/>
-                  </a:ext>
-                </a:extLst>
-              </a:tr>
-            </a:tbl>
-          </a:graphicData>
-        </a:graphic>
-      </p:graphicFrame>
-    </p:spTree>
-    <p:extLst>
-      <p:ext uri="{BB962C8B-B14F-4D97-AF65-F5344CB8AC3E}">
-        <p14:creationId xmlns:p14="http://schemas.microsoft.com/office/powerpoint/2010/main" val="1137492495"/>
-      </p:ext>
-    </p:extLst>
-  </p:cSld>
-  <p:clrMapOvr>
-    <a:masterClrMapping/>
-  </p:clrMapOvr>
-</p:sld>
-</file>
-
-<file path=ppt/slides/slide7.xml><?xml version="1.0" encoding="utf-8"?>
-<p:sld xmlns:a="http://schemas.openxmlformats.org/drawingml/2006/main" xmlns:r="http://schemas.openxmlformats.org/officeDocument/2006/relationships" xmlns:p="http://schemas.openxmlformats.org/presentationml/2006/main">
-  <p:cSld>
-    <p:bg>
-      <p:bgPr>
-        <a:solidFill>
-          <a:srgbClr val="D9EAD3"/>
-        </a:solidFill>
-        <a:effectLst/>
-      </p:bgPr>
-    </p:bg>
-    <p:spTree>
-      <p:nvGrpSpPr>
-        <p:cNvPr id="1" name="Shape 72"/>
-        <p:cNvGrpSpPr/>
-        <p:nvPr/>
-      </p:nvGrpSpPr>
-      <p:grpSpPr>
-        <a:xfrm>
-          <a:off x="0" y="0"/>
-          <a:ext cx="0" cy="0"/>
-          <a:chOff x="0" y="0"/>
-          <a:chExt cx="0" cy="0"/>
-        </a:xfrm>
-      </p:grpSpPr>
-      <p:sp>
-        <p:nvSpPr>
-          <p:cNvPr id="73" name="Google Shape;73;p16"/>
-          <p:cNvSpPr txBox="1">
-            <a:spLocks noGrp="1"/>
-          </p:cNvSpPr>
-          <p:nvPr>
-            <p:ph type="title"/>
-          </p:nvPr>
-        </p:nvSpPr>
-        <p:spPr>
-          <a:xfrm>
-            <a:off x="311700" y="445025"/>
-            <a:ext cx="8520600" cy="572700"/>
-          </a:xfrm>
-          <a:prstGeom prst="rect">
-            <a:avLst/>
-          </a:prstGeom>
-        </p:spPr>
-        <p:txBody>
-          <a:bodyPr spcFirstLastPara="1" wrap="square" lIns="91425" tIns="91425" rIns="91425" bIns="91425" anchor="t" anchorCtr="0">
-            <a:noAutofit/>
-          </a:bodyPr>
-          <a:lstStyle/>
-          <a:p>
-            <a:pPr marL="0" lvl="0" indent="0" algn="l" rtl="0">
-              <a:spcBef>
-                <a:spcPts val="0"/>
-              </a:spcBef>
-              <a:spcAft>
-                <a:spcPts val="0"/>
-              </a:spcAft>
-              <a:buNone/>
-            </a:pPr>
-            <a:r>
-              <a:rPr lang="en" dirty="0"/>
-              <a:t>Component 2 (Trello screenshot)</a:t>
-            </a:r>
-            <a:endParaRPr dirty="0"/>
-          </a:p>
-        </p:txBody>
-      </p:sp>
-    </p:spTree>
-    <p:extLst>
-      <p:ext uri="{BB962C8B-B14F-4D97-AF65-F5344CB8AC3E}">
-        <p14:creationId xmlns:p14="http://schemas.microsoft.com/office/powerpoint/2010/main" val="1060606800"/>
-      </p:ext>
-    </p:extLst>
-  </p:cSld>
-  <p:clrMapOvr>
-    <a:masterClrMapping/>
-  </p:clrMapOvr>
-</p:sld>
-</file>
-
-<file path=ppt/slides/slide8.xml><?xml version="1.0" encoding="utf-8"?>
-<p:sld xmlns:a="http://schemas.openxmlformats.org/drawingml/2006/main" xmlns:r="http://schemas.openxmlformats.org/officeDocument/2006/relationships" xmlns:p="http://schemas.openxmlformats.org/presentationml/2006/main">
-  <p:cSld>
-    <p:spTree>
-      <p:nvGrpSpPr>
-        <p:cNvPr id="1" name="Shape 77"/>
-        <p:cNvGrpSpPr/>
-        <p:nvPr/>
-      </p:nvGrpSpPr>
-      <p:grpSpPr>
-        <a:xfrm>
-          <a:off x="0" y="0"/>
-          <a:ext cx="0" cy="0"/>
-          <a:chOff x="0" y="0"/>
-          <a:chExt cx="0" cy="0"/>
-        </a:xfrm>
-      </p:grpSpPr>
-      <p:sp>
-        <p:nvSpPr>
-          <p:cNvPr id="78" name="Google Shape;78;p17"/>
-          <p:cNvSpPr txBox="1">
-            <a:spLocks noGrp="1"/>
-          </p:cNvSpPr>
-          <p:nvPr>
-            <p:ph type="title"/>
-          </p:nvPr>
-        </p:nvSpPr>
-        <p:spPr>
-          <a:xfrm>
-            <a:off x="311700" y="445025"/>
-            <a:ext cx="8520600" cy="572700"/>
-          </a:xfrm>
-          <a:prstGeom prst="rect">
-            <a:avLst/>
-          </a:prstGeom>
-        </p:spPr>
-        <p:txBody>
-          <a:bodyPr spcFirstLastPara="1" wrap="square" lIns="91425" tIns="91425" rIns="91425" bIns="91425" anchor="t" anchorCtr="0">
-            <a:noAutofit/>
-          </a:bodyPr>
-          <a:lstStyle/>
-          <a:p>
-            <a:pPr marL="0" lvl="0" indent="0" algn="l" rtl="0">
-              <a:spcBef>
-                <a:spcPts val="0"/>
-              </a:spcBef>
-              <a:spcAft>
-                <a:spcPts val="0"/>
-              </a:spcAft>
-              <a:buNone/>
-            </a:pPr>
-            <a:r>
-              <a:rPr lang="en" dirty="0"/>
-              <a:t>Component 2 - Test Plan (?and screenshot)</a:t>
+              <a:t>Component 1 version 2 - Test Plan (?and screenshot)</a:t>
             </a:r>
             <a:endParaRPr dirty="0"/>
           </a:p>
@@ -8641,7 +10255,7 @@
 </p:sld>
 </file>
 
-<file path=ppt/slides/slide9.xml><?xml version="1.0" encoding="utf-8"?>
+<file path=ppt/slides/slide7.xml><?xml version="1.0" encoding="utf-8"?>
 <p:sld xmlns:a="http://schemas.openxmlformats.org/drawingml/2006/main" xmlns:r="http://schemas.openxmlformats.org/officeDocument/2006/relationships" xmlns:p="http://schemas.openxmlformats.org/presentationml/2006/main">
   <p:cSld>
     <p:bg>
@@ -8654,7 +10268,7 @@
     </p:bg>
     <p:spTree>
       <p:nvGrpSpPr>
-        <p:cNvPr id="1" name="Shape 83"/>
+        <p:cNvPr id="1" name="Shape 72"/>
         <p:cNvGrpSpPr/>
         <p:nvPr/>
       </p:nvGrpSpPr>
@@ -8668,7 +10282,7 @@
       </p:grpSpPr>
       <p:sp>
         <p:nvSpPr>
-          <p:cNvPr id="84" name="Google Shape;84;p18"/>
+          <p:cNvPr id="73" name="Google Shape;73;p16"/>
           <p:cNvSpPr txBox="1">
             <a:spLocks noGrp="1"/>
           </p:cNvSpPr>
@@ -8701,27 +10315,87 @@
               <a:buNone/>
             </a:pPr>
             <a:r>
-              <a:rPr lang="en"/>
-              <a:t>Version Control Evidence</a:t>
+              <a:rPr lang="en" dirty="0"/>
+              <a:t>Component 2 (Trello screenshot)</a:t>
             </a:r>
-            <a:endParaRPr/>
+            <a:endParaRPr dirty="0"/>
           </a:p>
         </p:txBody>
       </p:sp>
+      <p:pic>
+        <p:nvPicPr>
+          <p:cNvPr id="3" name="Picture 2">
+            <a:extLst>
+              <a:ext uri="{FF2B5EF4-FFF2-40B4-BE49-F238E27FC236}">
+                <a16:creationId xmlns:a16="http://schemas.microsoft.com/office/drawing/2014/main" id="{AE7E94F7-15E4-4B17-9019-7FE05A5EAC96}"/>
+              </a:ext>
+            </a:extLst>
+          </p:cNvPr>
+          <p:cNvPicPr>
+            <a:picLocks noChangeAspect="1"/>
+          </p:cNvPicPr>
+          <p:nvPr/>
+        </p:nvPicPr>
+        <p:blipFill>
+          <a:blip r:embed="rId3"/>
+          <a:stretch>
+            <a:fillRect/>
+          </a:stretch>
+        </p:blipFill>
+        <p:spPr>
+          <a:xfrm>
+            <a:off x="0" y="1476679"/>
+            <a:ext cx="9144000" cy="2190141"/>
+          </a:xfrm>
+          <a:prstGeom prst="rect">
+            <a:avLst/>
+          </a:prstGeom>
+        </p:spPr>
+      </p:pic>
+    </p:spTree>
+    <p:extLst>
+      <p:ext uri="{BB962C8B-B14F-4D97-AF65-F5344CB8AC3E}">
+        <p14:creationId xmlns:p14="http://schemas.microsoft.com/office/powerpoint/2010/main" val="1060606800"/>
+      </p:ext>
+    </p:extLst>
+  </p:cSld>
+  <p:clrMapOvr>
+    <a:masterClrMapping/>
+  </p:clrMapOvr>
+</p:sld>
+</file>
+
+<file path=ppt/slides/slide8.xml><?xml version="1.0" encoding="utf-8"?>
+<p:sld xmlns:a="http://schemas.openxmlformats.org/drawingml/2006/main" xmlns:r="http://schemas.openxmlformats.org/officeDocument/2006/relationships" xmlns:p="http://schemas.openxmlformats.org/presentationml/2006/main">
+  <p:cSld>
+    <p:spTree>
+      <p:nvGrpSpPr>
+        <p:cNvPr id="1" name="Shape 77"/>
+        <p:cNvGrpSpPr/>
+        <p:nvPr/>
+      </p:nvGrpSpPr>
+      <p:grpSpPr>
+        <a:xfrm>
+          <a:off x="0" y="0"/>
+          <a:ext cx="0" cy="0"/>
+          <a:chOff x="0" y="0"/>
+          <a:chExt cx="0" cy="0"/>
+        </a:xfrm>
+      </p:grpSpPr>
       <p:sp>
         <p:nvSpPr>
-          <p:cNvPr id="85" name="Google Shape;85;p18"/>
+          <p:cNvPr id="78" name="Google Shape;78;p17"/>
           <p:cNvSpPr txBox="1">
             <a:spLocks noGrp="1"/>
           </p:cNvSpPr>
           <p:nvPr>
-            <p:ph type="body" idx="1"/>
+            <p:ph type="title"/>
           </p:nvPr>
         </p:nvSpPr>
         <p:spPr>
           <a:xfrm>
-            <a:off x="311700" y="1152475"/>
-            <a:ext cx="8464200" cy="3739200"/>
+            <a:off x="311700" y="445025"/>
+            <a:ext cx="8520600" cy="572700"/>
           </a:xfrm>
           <a:prstGeom prst="rect">
             <a:avLst/>
@@ -8738,19 +10412,520 @@
                 <a:spcPts val="0"/>
               </a:spcBef>
               <a:spcAft>
-                <a:spcPts val="1600"/>
+                <a:spcPts val="0"/>
               </a:spcAft>
               <a:buNone/>
             </a:pPr>
             <a:r>
-              <a:rPr lang="en" i="1"/>
-              <a:t>Your version control evidence should go here.  This could be in the form of annotated screenshots which show you you managed this process or you could make a brief screencast explaining how you implemented version control.</a:t>
+              <a:rPr lang="en" dirty="0"/>
+              <a:t>Component 2 version 1 - Test Plan (?and screenshot)</a:t>
             </a:r>
-            <a:endParaRPr i="1"/>
+            <a:endParaRPr dirty="0"/>
           </a:p>
         </p:txBody>
       </p:sp>
+      <p:graphicFrame>
+        <p:nvGraphicFramePr>
+          <p:cNvPr id="79" name="Google Shape;79;p17"/>
+          <p:cNvGraphicFramePr/>
+          <p:nvPr>
+            <p:extLst>
+              <p:ext uri="{D42A27DB-BD31-4B8C-83A1-F6EECF244321}">
+                <p14:modId xmlns:p14="http://schemas.microsoft.com/office/powerpoint/2010/main" val="688095939"/>
+              </p:ext>
+            </p:extLst>
+          </p:nvPr>
+        </p:nvGraphicFramePr>
+        <p:xfrm>
+          <a:off x="252227" y="3371589"/>
+          <a:ext cx="8520600" cy="1737300"/>
+        </p:xfrm>
+        <a:graphic>
+          <a:graphicData uri="http://schemas.openxmlformats.org/drawingml/2006/table">
+            <a:tbl>
+              <a:tblPr>
+                <a:noFill/>
+                <a:tableStyleId>{E1099E06-0E6B-448D-9D27-60429F06E6F4}</a:tableStyleId>
+              </a:tblPr>
+              <a:tblGrid>
+                <a:gridCol w="4260300">
+                  <a:extLst>
+                    <a:ext uri="{9D8B030D-6E8A-4147-A177-3AD203B41FA5}">
+                      <a16:colId xmlns:a16="http://schemas.microsoft.com/office/drawing/2014/main" val="20000"/>
+                    </a:ext>
+                  </a:extLst>
+                </a:gridCol>
+                <a:gridCol w="4260300">
+                  <a:extLst>
+                    <a:ext uri="{9D8B030D-6E8A-4147-A177-3AD203B41FA5}">
+                      <a16:colId xmlns:a16="http://schemas.microsoft.com/office/drawing/2014/main" val="20001"/>
+                    </a:ext>
+                  </a:extLst>
+                </a:gridCol>
+              </a:tblGrid>
+              <a:tr h="381000">
+                <a:tc>
+                  <a:txBody>
+                    <a:bodyPr/>
+                    <a:lstStyle/>
+                    <a:p>
+                      <a:pPr marL="0" lvl="0" indent="0" algn="l" rtl="0">
+                        <a:spcBef>
+                          <a:spcPts val="0"/>
+                        </a:spcBef>
+                        <a:spcAft>
+                          <a:spcPts val="0"/>
+                        </a:spcAft>
+                        <a:buNone/>
+                      </a:pPr>
+                      <a:r>
+                        <a:rPr lang="en" sz="1800" b="1" dirty="0"/>
+                        <a:t>Test Case </a:t>
+                      </a:r>
+                      <a:endParaRPr sz="1800" b="1" dirty="0"/>
+                    </a:p>
+                  </a:txBody>
+                  <a:tcPr marL="91425" marR="91425" marT="91425" marB="91425">
+                    <a:solidFill>
+                      <a:srgbClr val="CCCCCC"/>
+                    </a:solidFill>
+                  </a:tcPr>
+                </a:tc>
+                <a:tc>
+                  <a:txBody>
+                    <a:bodyPr/>
+                    <a:lstStyle/>
+                    <a:p>
+                      <a:pPr marL="0" lvl="0" indent="0" algn="l" rtl="0">
+                        <a:spcBef>
+                          <a:spcPts val="0"/>
+                        </a:spcBef>
+                        <a:spcAft>
+                          <a:spcPts val="0"/>
+                        </a:spcAft>
+                        <a:buNone/>
+                      </a:pPr>
+                      <a:r>
+                        <a:rPr lang="en" sz="1800" b="1" dirty="0"/>
+                        <a:t>Expected Values</a:t>
+                      </a:r>
+                      <a:endParaRPr sz="1800" b="1" dirty="0"/>
+                    </a:p>
+                  </a:txBody>
+                  <a:tcPr marL="91425" marR="91425" marT="91425" marB="91425">
+                    <a:solidFill>
+                      <a:srgbClr val="CCCCCC"/>
+                    </a:solidFill>
+                  </a:tcPr>
+                </a:tc>
+                <a:extLst>
+                  <a:ext uri="{0D108BD9-81ED-4DB2-BD59-A6C34878D82A}">
+                    <a16:rowId xmlns:a16="http://schemas.microsoft.com/office/drawing/2014/main" val="10000"/>
+                  </a:ext>
+                </a:extLst>
+              </a:tr>
+              <a:tr h="396200">
+                <a:tc>
+                  <a:txBody>
+                    <a:bodyPr/>
+                    <a:lstStyle/>
+                    <a:p>
+                      <a:pPr marL="0" lvl="0" indent="0" algn="l" rtl="0">
+                        <a:spcBef>
+                          <a:spcPts val="0"/>
+                        </a:spcBef>
+                        <a:spcAft>
+                          <a:spcPts val="0"/>
+                        </a:spcAft>
+                        <a:buNone/>
+                      </a:pPr>
+                      <a:r>
+                        <a:rPr lang="en-NZ" sz="1800" dirty="0"/>
+                        <a:t>Run program</a:t>
+                      </a:r>
+                    </a:p>
+                  </a:txBody>
+                  <a:tcPr marL="91425" marR="91425" marT="91425" marB="91425"/>
+                </a:tc>
+                <a:tc>
+                  <a:txBody>
+                    <a:bodyPr/>
+                    <a:lstStyle/>
+                    <a:p>
+                      <a:pPr marL="0" lvl="0" indent="0" algn="l" rtl="0">
+                        <a:spcBef>
+                          <a:spcPts val="0"/>
+                        </a:spcBef>
+                        <a:spcAft>
+                          <a:spcPts val="0"/>
+                        </a:spcAft>
+                        <a:buNone/>
+                      </a:pPr>
+                      <a:r>
+                        <a:rPr lang="en-US" sz="1800" dirty="0"/>
+                        <a:t>Enter d program prints delivery </a:t>
+                      </a:r>
+                    </a:p>
+                    <a:p>
+                      <a:pPr marL="0" lvl="0" indent="0" algn="l" rtl="0">
+                        <a:spcBef>
+                          <a:spcPts val="0"/>
+                        </a:spcBef>
+                        <a:spcAft>
+                          <a:spcPts val="0"/>
+                        </a:spcAft>
+                        <a:buNone/>
+                      </a:pPr>
+                      <a:r>
+                        <a:rPr lang="en-US" sz="1800" dirty="0"/>
+                        <a:t>Enter p program prints pickup</a:t>
+                      </a:r>
+                    </a:p>
+                    <a:p>
+                      <a:pPr marL="0" lvl="0" indent="0" algn="l" rtl="0">
+                        <a:spcBef>
+                          <a:spcPts val="0"/>
+                        </a:spcBef>
+                        <a:spcAft>
+                          <a:spcPts val="0"/>
+                        </a:spcAft>
+                        <a:buNone/>
+                      </a:pPr>
+                      <a:r>
+                        <a:rPr lang="en-US" sz="1800" dirty="0"/>
+                        <a:t>Enter invalid program prints error message</a:t>
+                      </a:r>
+                    </a:p>
+                  </a:txBody>
+                  <a:tcPr marL="91425" marR="91425" marT="91425" marB="91425"/>
+                </a:tc>
+                <a:extLst>
+                  <a:ext uri="{0D108BD9-81ED-4DB2-BD59-A6C34878D82A}">
+                    <a16:rowId xmlns:a16="http://schemas.microsoft.com/office/drawing/2014/main" val="10001"/>
+                  </a:ext>
+                </a:extLst>
+              </a:tr>
+            </a:tbl>
+          </a:graphicData>
+        </a:graphic>
+      </p:graphicFrame>
+      <p:pic>
+        <p:nvPicPr>
+          <p:cNvPr id="7" name="Picture 6">
+            <a:extLst>
+              <a:ext uri="{FF2B5EF4-FFF2-40B4-BE49-F238E27FC236}">
+                <a16:creationId xmlns:a16="http://schemas.microsoft.com/office/drawing/2014/main" id="{7F006EC4-A2EF-4EB8-83C8-3AE5758EEE9C}"/>
+              </a:ext>
+            </a:extLst>
+          </p:cNvPr>
+          <p:cNvPicPr>
+            <a:picLocks noChangeAspect="1"/>
+          </p:cNvPicPr>
+          <p:nvPr/>
+        </p:nvPicPr>
+        <p:blipFill>
+          <a:blip r:embed="rId3"/>
+          <a:stretch>
+            <a:fillRect/>
+          </a:stretch>
+        </p:blipFill>
+        <p:spPr>
+          <a:xfrm>
+            <a:off x="2311539" y="799839"/>
+            <a:ext cx="3145124" cy="2571750"/>
+          </a:xfrm>
+          <a:prstGeom prst="rect">
+            <a:avLst/>
+          </a:prstGeom>
+        </p:spPr>
+      </p:pic>
     </p:spTree>
+    <p:extLst>
+      <p:ext uri="{BB962C8B-B14F-4D97-AF65-F5344CB8AC3E}">
+        <p14:creationId xmlns:p14="http://schemas.microsoft.com/office/powerpoint/2010/main" val="1137492495"/>
+      </p:ext>
+    </p:extLst>
+  </p:cSld>
+  <p:clrMapOvr>
+    <a:masterClrMapping/>
+  </p:clrMapOvr>
+</p:sld>
+</file>
+
+<file path=ppt/slides/slide9.xml><?xml version="1.0" encoding="utf-8"?>
+<p:sld xmlns:a="http://schemas.openxmlformats.org/drawingml/2006/main" xmlns:r="http://schemas.openxmlformats.org/officeDocument/2006/relationships" xmlns:p="http://schemas.openxmlformats.org/presentationml/2006/main">
+  <p:cSld>
+    <p:spTree>
+      <p:nvGrpSpPr>
+        <p:cNvPr id="1" name="Shape 77"/>
+        <p:cNvGrpSpPr/>
+        <p:nvPr/>
+      </p:nvGrpSpPr>
+      <p:grpSpPr>
+        <a:xfrm>
+          <a:off x="0" y="0"/>
+          <a:ext cx="0" cy="0"/>
+          <a:chOff x="0" y="0"/>
+          <a:chExt cx="0" cy="0"/>
+        </a:xfrm>
+      </p:grpSpPr>
+      <p:sp>
+        <p:nvSpPr>
+          <p:cNvPr id="78" name="Google Shape;78;p17"/>
+          <p:cNvSpPr txBox="1">
+            <a:spLocks noGrp="1"/>
+          </p:cNvSpPr>
+          <p:nvPr>
+            <p:ph type="title"/>
+          </p:nvPr>
+        </p:nvSpPr>
+        <p:spPr>
+          <a:xfrm>
+            <a:off x="311700" y="445025"/>
+            <a:ext cx="8520600" cy="572700"/>
+          </a:xfrm>
+          <a:prstGeom prst="rect">
+            <a:avLst/>
+          </a:prstGeom>
+        </p:spPr>
+        <p:txBody>
+          <a:bodyPr spcFirstLastPara="1" wrap="square" lIns="91425" tIns="91425" rIns="91425" bIns="91425" anchor="t" anchorCtr="0">
+            <a:noAutofit/>
+          </a:bodyPr>
+          <a:lstStyle/>
+          <a:p>
+            <a:pPr marL="0" lvl="0" indent="0" algn="l" rtl="0">
+              <a:spcBef>
+                <a:spcPts val="0"/>
+              </a:spcBef>
+              <a:spcAft>
+                <a:spcPts val="0"/>
+              </a:spcAft>
+              <a:buNone/>
+            </a:pPr>
+            <a:r>
+              <a:rPr lang="en" dirty="0"/>
+              <a:t>Component 2 version 2 - Test Plan (?and screenshot)</a:t>
+            </a:r>
+            <a:endParaRPr dirty="0"/>
+          </a:p>
+        </p:txBody>
+      </p:sp>
+      <p:graphicFrame>
+        <p:nvGraphicFramePr>
+          <p:cNvPr id="79" name="Google Shape;79;p17"/>
+          <p:cNvGraphicFramePr/>
+          <p:nvPr/>
+        </p:nvGraphicFramePr>
+        <p:xfrm>
+          <a:off x="252227" y="3371589"/>
+          <a:ext cx="8520600" cy="1462980"/>
+        </p:xfrm>
+        <a:graphic>
+          <a:graphicData uri="http://schemas.openxmlformats.org/drawingml/2006/table">
+            <a:tbl>
+              <a:tblPr>
+                <a:noFill/>
+                <a:tableStyleId>{E1099E06-0E6B-448D-9D27-60429F06E6F4}</a:tableStyleId>
+              </a:tblPr>
+              <a:tblGrid>
+                <a:gridCol w="4260300">
+                  <a:extLst>
+                    <a:ext uri="{9D8B030D-6E8A-4147-A177-3AD203B41FA5}">
+                      <a16:colId xmlns:a16="http://schemas.microsoft.com/office/drawing/2014/main" val="20000"/>
+                    </a:ext>
+                  </a:extLst>
+                </a:gridCol>
+                <a:gridCol w="4260300">
+                  <a:extLst>
+                    <a:ext uri="{9D8B030D-6E8A-4147-A177-3AD203B41FA5}">
+                      <a16:colId xmlns:a16="http://schemas.microsoft.com/office/drawing/2014/main" val="20001"/>
+                    </a:ext>
+                  </a:extLst>
+                </a:gridCol>
+              </a:tblGrid>
+              <a:tr h="381000">
+                <a:tc>
+                  <a:txBody>
+                    <a:bodyPr/>
+                    <a:lstStyle/>
+                    <a:p>
+                      <a:pPr marL="0" lvl="0" indent="0" algn="l" rtl="0">
+                        <a:spcBef>
+                          <a:spcPts val="0"/>
+                        </a:spcBef>
+                        <a:spcAft>
+                          <a:spcPts val="0"/>
+                        </a:spcAft>
+                        <a:buNone/>
+                      </a:pPr>
+                      <a:r>
+                        <a:rPr lang="en" sz="1800" b="1" dirty="0"/>
+                        <a:t>Test Case </a:t>
+                      </a:r>
+                      <a:endParaRPr sz="1800" b="1" dirty="0"/>
+                    </a:p>
+                  </a:txBody>
+                  <a:tcPr marL="91425" marR="91425" marT="91425" marB="91425">
+                    <a:solidFill>
+                      <a:srgbClr val="CCCCCC"/>
+                    </a:solidFill>
+                  </a:tcPr>
+                </a:tc>
+                <a:tc>
+                  <a:txBody>
+                    <a:bodyPr/>
+                    <a:lstStyle/>
+                    <a:p>
+                      <a:pPr marL="0" lvl="0" indent="0" algn="l" rtl="0">
+                        <a:spcBef>
+                          <a:spcPts val="0"/>
+                        </a:spcBef>
+                        <a:spcAft>
+                          <a:spcPts val="0"/>
+                        </a:spcAft>
+                        <a:buNone/>
+                      </a:pPr>
+                      <a:r>
+                        <a:rPr lang="en" sz="1800" b="1" dirty="0"/>
+                        <a:t>Expected Values</a:t>
+                      </a:r>
+                      <a:endParaRPr sz="1800" b="1" dirty="0"/>
+                    </a:p>
+                  </a:txBody>
+                  <a:tcPr marL="91425" marR="91425" marT="91425" marB="91425">
+                    <a:solidFill>
+                      <a:srgbClr val="CCCCCC"/>
+                    </a:solidFill>
+                  </a:tcPr>
+                </a:tc>
+                <a:extLst>
+                  <a:ext uri="{0D108BD9-81ED-4DB2-BD59-A6C34878D82A}">
+                    <a16:rowId xmlns:a16="http://schemas.microsoft.com/office/drawing/2014/main" val="10000"/>
+                  </a:ext>
+                </a:extLst>
+              </a:tr>
+              <a:tr h="396200">
+                <a:tc>
+                  <a:txBody>
+                    <a:bodyPr/>
+                    <a:lstStyle/>
+                    <a:p>
+                      <a:pPr marL="0" lvl="0" indent="0" algn="l" rtl="0">
+                        <a:spcBef>
+                          <a:spcPts val="0"/>
+                        </a:spcBef>
+                        <a:spcAft>
+                          <a:spcPts val="0"/>
+                        </a:spcAft>
+                        <a:buNone/>
+                      </a:pPr>
+                      <a:r>
+                        <a:rPr lang="en-NZ" sz="1800" dirty="0"/>
+                        <a:t>Run program</a:t>
+                      </a:r>
+                    </a:p>
+                  </a:txBody>
+                  <a:tcPr marL="91425" marR="91425" marT="91425" marB="91425"/>
+                </a:tc>
+                <a:tc>
+                  <a:txBody>
+                    <a:bodyPr/>
+                    <a:lstStyle/>
+                    <a:p>
+                      <a:pPr marL="0" lvl="0" indent="0" algn="l" rtl="0">
+                        <a:spcBef>
+                          <a:spcPts val="0"/>
+                        </a:spcBef>
+                        <a:spcAft>
+                          <a:spcPts val="0"/>
+                        </a:spcAft>
+                        <a:buNone/>
+                      </a:pPr>
+                      <a:r>
+                        <a:rPr lang="en-US" sz="1800" dirty="0"/>
+                        <a:t>Enter d program prints delivery </a:t>
+                      </a:r>
+                    </a:p>
+                    <a:p>
+                      <a:pPr marL="0" lvl="0" indent="0" algn="l" rtl="0">
+                        <a:spcBef>
+                          <a:spcPts val="0"/>
+                        </a:spcBef>
+                        <a:spcAft>
+                          <a:spcPts val="0"/>
+                        </a:spcAft>
+                        <a:buNone/>
+                      </a:pPr>
+                      <a:r>
+                        <a:rPr lang="en-US" sz="1800" dirty="0"/>
+                        <a:t>Enter p program prints pickup</a:t>
+                      </a:r>
+                    </a:p>
+                    <a:p>
+                      <a:pPr marL="0" lvl="0" indent="0" algn="l" rtl="0">
+                        <a:spcBef>
+                          <a:spcPts val="0"/>
+                        </a:spcBef>
+                        <a:spcAft>
+                          <a:spcPts val="0"/>
+                        </a:spcAft>
+                        <a:buNone/>
+                      </a:pPr>
+                      <a:r>
+                        <a:rPr lang="en-US" sz="1800" dirty="0"/>
+                        <a:t>Enter invalid program prints nothing</a:t>
+                      </a:r>
+                    </a:p>
+                  </a:txBody>
+                  <a:tcPr marL="91425" marR="91425" marT="91425" marB="91425"/>
+                </a:tc>
+                <a:extLst>
+                  <a:ext uri="{0D108BD9-81ED-4DB2-BD59-A6C34878D82A}">
+                    <a16:rowId xmlns:a16="http://schemas.microsoft.com/office/drawing/2014/main" val="10001"/>
+                  </a:ext>
+                </a:extLst>
+              </a:tr>
+            </a:tbl>
+          </a:graphicData>
+        </a:graphic>
+      </p:graphicFrame>
+      <p:pic>
+        <p:nvPicPr>
+          <p:cNvPr id="5" name="Picture 4">
+            <a:extLst>
+              <a:ext uri="{FF2B5EF4-FFF2-40B4-BE49-F238E27FC236}">
+                <a16:creationId xmlns:a16="http://schemas.microsoft.com/office/drawing/2014/main" id="{91E5A385-8464-49EA-A8EA-156C3BEF1CAE}"/>
+              </a:ext>
+            </a:extLst>
+          </p:cNvPr>
+          <p:cNvPicPr>
+            <a:picLocks noChangeAspect="1"/>
+          </p:cNvPicPr>
+          <p:nvPr/>
+        </p:nvPicPr>
+        <p:blipFill>
+          <a:blip r:embed="rId3"/>
+          <a:stretch>
+            <a:fillRect/>
+          </a:stretch>
+        </p:blipFill>
+        <p:spPr>
+          <a:xfrm>
+            <a:off x="2289432" y="1017725"/>
+            <a:ext cx="3085455" cy="2309199"/>
+          </a:xfrm>
+          <a:prstGeom prst="rect">
+            <a:avLst/>
+          </a:prstGeom>
+        </p:spPr>
+      </p:pic>
+    </p:spTree>
+    <p:extLst>
+      <p:ext uri="{BB962C8B-B14F-4D97-AF65-F5344CB8AC3E}">
+        <p14:creationId xmlns:p14="http://schemas.microsoft.com/office/powerpoint/2010/main" val="2117696396"/>
+      </p:ext>
+    </p:extLst>
   </p:cSld>
   <p:clrMapOvr>
     <a:masterClrMapping/>

</xml_diff>

<commit_message>
Added Validation to number of pizzas
Added validation to number of pizza entry to restrict number to between 1 and 5 and only accept a valid integer
</commit_message>
<xml_diff>
--- a/022_91893+_+91897+Documentation.pptx
+++ b/022_91893+_+91897+Documentation.pptx
@@ -5,7 +5,7 @@
     <p:sldMasterId id="2147483659" r:id="rId1"/>
   </p:sldMasterIdLst>
   <p:notesMasterIdLst>
-    <p:notesMasterId r:id="rId18"/>
+    <p:notesMasterId r:id="rId17"/>
   </p:notesMasterIdLst>
   <p:sldIdLst>
     <p:sldId id="256" r:id="rId2"/>
@@ -21,9 +21,8 @@
     <p:sldId id="267" r:id="rId12"/>
     <p:sldId id="269" r:id="rId13"/>
     <p:sldId id="270" r:id="rId14"/>
-    <p:sldId id="266" r:id="rId15"/>
-    <p:sldId id="261" r:id="rId16"/>
-    <p:sldId id="262" r:id="rId17"/>
+    <p:sldId id="261" r:id="rId15"/>
+    <p:sldId id="262" r:id="rId16"/>
   </p:sldIdLst>
   <p:sldSz cx="9144000" cy="5143500" type="screen16x9"/>
   <p:notesSz cx="6858000" cy="9144000"/>
@@ -288,7 +287,7 @@
   <pc:docChgLst>
     <pc:chgData name="George El Hayek" userId="e516d85fdd18eb06" providerId="LiveId" clId="{C8C7263D-22F5-480D-A4A7-EE3D0F0DB4C3}"/>
     <pc:docChg chg="undo custSel addSld delSld modSld sldOrd">
-      <pc:chgData name="George El Hayek" userId="e516d85fdd18eb06" providerId="LiveId" clId="{C8C7263D-22F5-480D-A4A7-EE3D0F0DB4C3}" dt="2022-02-18T02:09:46.487" v="1090" actId="1076"/>
+      <pc:chgData name="George El Hayek" userId="e516d85fdd18eb06" providerId="LiveId" clId="{C8C7263D-22F5-480D-A4A7-EE3D0F0DB4C3}" dt="2022-03-09T01:51:03.896" v="1110" actId="2696"/>
       <pc:docMkLst>
         <pc:docMk/>
       </pc:docMkLst>
@@ -304,6 +303,21 @@
             <pc:docMk/>
             <pc:sldMk cId="0" sldId="256"/>
             <ac:spMk id="55" creationId="{00000000-0000-0000-0000-000000000000}"/>
+          </ac:spMkLst>
+        </pc:spChg>
+      </pc:sldChg>
+      <pc:sldChg chg="modSp mod">
+        <pc:chgData name="George El Hayek" userId="e516d85fdd18eb06" providerId="LiveId" clId="{C8C7263D-22F5-480D-A4A7-EE3D0F0DB4C3}" dt="2022-03-09T01:50:55.297" v="1109" actId="20577"/>
+        <pc:sldMkLst>
+          <pc:docMk/>
+          <pc:sldMk cId="0" sldId="257"/>
+        </pc:sldMkLst>
+        <pc:spChg chg="mod">
+          <ac:chgData name="George El Hayek" userId="e516d85fdd18eb06" providerId="LiveId" clId="{C8C7263D-22F5-480D-A4A7-EE3D0F0DB4C3}" dt="2022-03-09T01:50:55.297" v="1109" actId="20577"/>
+          <ac:spMkLst>
+            <pc:docMk/>
+            <pc:sldMk cId="0" sldId="257"/>
+            <ac:spMk id="62" creationId="{00000000-0000-0000-0000-000000000000}"/>
           </ac:spMkLst>
         </pc:spChg>
       </pc:sldChg>
@@ -549,8 +563,8 @@
           </ac:picMkLst>
         </pc:picChg>
       </pc:sldChg>
-      <pc:sldChg chg="add ord">
-        <pc:chgData name="George El Hayek" userId="e516d85fdd18eb06" providerId="LiveId" clId="{C8C7263D-22F5-480D-A4A7-EE3D0F0DB4C3}" dt="2022-02-15T20:13:43.098" v="406"/>
+      <pc:sldChg chg="add del ord">
+        <pc:chgData name="George El Hayek" userId="e516d85fdd18eb06" providerId="LiveId" clId="{C8C7263D-22F5-480D-A4A7-EE3D0F0DB4C3}" dt="2022-03-09T01:51:03.896" v="1110" actId="2696"/>
         <pc:sldMkLst>
           <pc:docMk/>
           <pc:sldMk cId="2298535692" sldId="266"/>
@@ -1796,115 +1810,6 @@
   <p:cSld>
     <p:spTree>
       <p:nvGrpSpPr>
-        <p:cNvPr id="1" name="Shape 69"/>
-        <p:cNvGrpSpPr/>
-        <p:nvPr/>
-      </p:nvGrpSpPr>
-      <p:grpSpPr>
-        <a:xfrm>
-          <a:off x="0" y="0"/>
-          <a:ext cx="0" cy="0"/>
-          <a:chOff x="0" y="0"/>
-          <a:chExt cx="0" cy="0"/>
-        </a:xfrm>
-      </p:grpSpPr>
-      <p:sp>
-        <p:nvSpPr>
-          <p:cNvPr id="70" name="Google Shape;70;gac10fef634_0_16:notes"/>
-          <p:cNvSpPr>
-            <a:spLocks noGrp="1" noRot="1" noChangeAspect="1"/>
-          </p:cNvSpPr>
-          <p:nvPr>
-            <p:ph type="sldImg" idx="2"/>
-          </p:nvPr>
-        </p:nvSpPr>
-        <p:spPr>
-          <a:xfrm>
-            <a:off x="381000" y="685800"/>
-            <a:ext cx="6096000" cy="3429000"/>
-          </a:xfrm>
-          <a:custGeom>
-            <a:avLst/>
-            <a:gdLst/>
-            <a:ahLst/>
-            <a:cxnLst/>
-            <a:rect l="l" t="t" r="r" b="b"/>
-            <a:pathLst>
-              <a:path w="120000" h="120000" extrusionOk="0">
-                <a:moveTo>
-                  <a:pt x="0" y="0"/>
-                </a:moveTo>
-                <a:lnTo>
-                  <a:pt x="120000" y="0"/>
-                </a:lnTo>
-                <a:lnTo>
-                  <a:pt x="120000" y="120000"/>
-                </a:lnTo>
-                <a:lnTo>
-                  <a:pt x="0" y="120000"/>
-                </a:lnTo>
-                <a:close/>
-              </a:path>
-            </a:pathLst>
-          </a:custGeom>
-        </p:spPr>
-      </p:sp>
-      <p:sp>
-        <p:nvSpPr>
-          <p:cNvPr id="71" name="Google Shape;71;gac10fef634_0_16:notes"/>
-          <p:cNvSpPr txBox="1">
-            <a:spLocks noGrp="1"/>
-          </p:cNvSpPr>
-          <p:nvPr>
-            <p:ph type="body" idx="1"/>
-          </p:nvPr>
-        </p:nvSpPr>
-        <p:spPr>
-          <a:xfrm>
-            <a:off x="685800" y="4343400"/>
-            <a:ext cx="5486400" cy="4114800"/>
-          </a:xfrm>
-          <a:prstGeom prst="rect">
-            <a:avLst/>
-          </a:prstGeom>
-        </p:spPr>
-        <p:txBody>
-          <a:bodyPr spcFirstLastPara="1" wrap="square" lIns="91425" tIns="91425" rIns="91425" bIns="91425" anchor="t" anchorCtr="0">
-            <a:noAutofit/>
-          </a:bodyPr>
-          <a:lstStyle/>
-          <a:p>
-            <a:pPr marL="0" lvl="0" indent="0" algn="l" rtl="0">
-              <a:spcBef>
-                <a:spcPts val="0"/>
-              </a:spcBef>
-              <a:spcAft>
-                <a:spcPts val="0"/>
-              </a:spcAft>
-              <a:buNone/>
-            </a:pPr>
-            <a:endParaRPr/>
-          </a:p>
-        </p:txBody>
-      </p:sp>
-    </p:spTree>
-    <p:extLst>
-      <p:ext uri="{BB962C8B-B14F-4D97-AF65-F5344CB8AC3E}">
-        <p14:creationId xmlns:p14="http://schemas.microsoft.com/office/powerpoint/2010/main" val="1092163332"/>
-      </p:ext>
-    </p:extLst>
-  </p:cSld>
-  <p:clrMapOvr>
-    <a:masterClrMapping/>
-  </p:clrMapOvr>
-</p:notes>
-</file>
-
-<file path=ppt/notesSlides/notesSlide15.xml><?xml version="1.0" encoding="utf-8"?>
-<p:notes xmlns:a="http://schemas.openxmlformats.org/drawingml/2006/main" xmlns:r="http://schemas.openxmlformats.org/officeDocument/2006/relationships" xmlns:p="http://schemas.openxmlformats.org/presentationml/2006/main" showMasterSp="0" showMasterPhAnim="0">
-  <p:cSld>
-    <p:spTree>
-      <p:nvGrpSpPr>
         <p:cNvPr id="1" name="Shape 80"/>
         <p:cNvGrpSpPr/>
         <p:nvPr/>
@@ -2025,7 +1930,7 @@
 </p:notes>
 </file>
 
-<file path=ppt/notesSlides/notesSlide16.xml><?xml version="1.0" encoding="utf-8"?>
+<file path=ppt/notesSlides/notesSlide15.xml><?xml version="1.0" encoding="utf-8"?>
 <p:notes xmlns:a="http://schemas.openxmlformats.org/drawingml/2006/main" xmlns:r="http://schemas.openxmlformats.org/officeDocument/2006/relationships" xmlns:p="http://schemas.openxmlformats.org/presentationml/2006/main" showMasterSp="0" showMasterPhAnim="0">
   <p:cSld>
     <p:spTree>
@@ -9327,86 +9232,6 @@
     </p:bg>
     <p:spTree>
       <p:nvGrpSpPr>
-        <p:cNvPr id="1" name="Shape 72"/>
-        <p:cNvGrpSpPr/>
-        <p:nvPr/>
-      </p:nvGrpSpPr>
-      <p:grpSpPr>
-        <a:xfrm>
-          <a:off x="0" y="0"/>
-          <a:ext cx="0" cy="0"/>
-          <a:chOff x="0" y="0"/>
-          <a:chExt cx="0" cy="0"/>
-        </a:xfrm>
-      </p:grpSpPr>
-      <p:sp>
-        <p:nvSpPr>
-          <p:cNvPr id="73" name="Google Shape;73;p16"/>
-          <p:cNvSpPr txBox="1">
-            <a:spLocks noGrp="1"/>
-          </p:cNvSpPr>
-          <p:nvPr>
-            <p:ph type="title"/>
-          </p:nvPr>
-        </p:nvSpPr>
-        <p:spPr>
-          <a:xfrm>
-            <a:off x="311700" y="445025"/>
-            <a:ext cx="8520600" cy="572700"/>
-          </a:xfrm>
-          <a:prstGeom prst="rect">
-            <a:avLst/>
-          </a:prstGeom>
-        </p:spPr>
-        <p:txBody>
-          <a:bodyPr spcFirstLastPara="1" wrap="square" lIns="91425" tIns="91425" rIns="91425" bIns="91425" anchor="t" anchorCtr="0">
-            <a:noAutofit/>
-          </a:bodyPr>
-          <a:lstStyle/>
-          <a:p>
-            <a:pPr marL="0" lvl="0" indent="0" algn="l" rtl="0">
-              <a:spcBef>
-                <a:spcPts val="0"/>
-              </a:spcBef>
-              <a:spcAft>
-                <a:spcPts val="0"/>
-              </a:spcAft>
-              <a:buNone/>
-            </a:pPr>
-            <a:r>
-              <a:rPr lang="en" dirty="0"/>
-              <a:t>Component 2 (Trello screenshot)</a:t>
-            </a:r>
-            <a:endParaRPr dirty="0"/>
-          </a:p>
-        </p:txBody>
-      </p:sp>
-    </p:spTree>
-    <p:extLst>
-      <p:ext uri="{BB962C8B-B14F-4D97-AF65-F5344CB8AC3E}">
-        <p14:creationId xmlns:p14="http://schemas.microsoft.com/office/powerpoint/2010/main" val="2298535692"/>
-      </p:ext>
-    </p:extLst>
-  </p:cSld>
-  <p:clrMapOvr>
-    <a:masterClrMapping/>
-  </p:clrMapOvr>
-</p:sld>
-</file>
-
-<file path=ppt/slides/slide15.xml><?xml version="1.0" encoding="utf-8"?>
-<p:sld xmlns:a="http://schemas.openxmlformats.org/drawingml/2006/main" xmlns:r="http://schemas.openxmlformats.org/officeDocument/2006/relationships" xmlns:p="http://schemas.openxmlformats.org/presentationml/2006/main">
-  <p:cSld>
-    <p:bg>
-      <p:bgPr>
-        <a:solidFill>
-          <a:srgbClr val="D9EAD3"/>
-        </a:solidFill>
-        <a:effectLst/>
-      </p:bgPr>
-    </p:bg>
-    <p:spTree>
-      <p:nvGrpSpPr>
         <p:cNvPr id="1" name="Shape 83"/>
         <p:cNvGrpSpPr/>
         <p:nvPr/>
@@ -9511,7 +9336,7 @@
 </p:sld>
 </file>
 
-<file path=ppt/slides/slide16.xml><?xml version="1.0" encoding="utf-8"?>
+<file path=ppt/slides/slide15.xml><?xml version="1.0" encoding="utf-8"?>
 <p:sld xmlns:a="http://schemas.openxmlformats.org/drawingml/2006/main" xmlns:r="http://schemas.openxmlformats.org/officeDocument/2006/relationships" xmlns:p="http://schemas.openxmlformats.org/presentationml/2006/main">
   <p:cSld>
     <p:bg>
@@ -9738,7 +9563,7 @@
                   <a:srgbClr val="741B47"/>
                 </a:solidFill>
               </a:rPr>
-              <a:t> to learn how to do this.</a:t>
+              <a:t> to learn how to do this. </a:t>
             </a:r>
             <a:endParaRPr dirty="0"/>
           </a:p>

</xml_diff>